<commit_message>
Presentation copy edit draft
- Expound on heat exchanger requirements
-Expand presentation slides
</commit_message>
<xml_diff>
--- a/Final/Project defense presentation.pptx
+++ b/Final/Project defense presentation.pptx
@@ -5,7 +5,7 @@
     <p:sldMasterId id="2147483648" r:id="rId1"/>
   </p:sldMasterIdLst>
   <p:notesMasterIdLst>
-    <p:notesMasterId r:id="rId30"/>
+    <p:notesMasterId r:id="rId32"/>
   </p:notesMasterIdLst>
   <p:sldIdLst>
     <p:sldId id="281" r:id="rId2"/>
@@ -28,14 +28,16 @@
     <p:sldId id="311" r:id="rId19"/>
     <p:sldId id="308" r:id="rId20"/>
     <p:sldId id="312" r:id="rId21"/>
-    <p:sldId id="317" r:id="rId22"/>
-    <p:sldId id="318" r:id="rId23"/>
-    <p:sldId id="319" r:id="rId24"/>
-    <p:sldId id="322" r:id="rId25"/>
-    <p:sldId id="323" r:id="rId26"/>
-    <p:sldId id="324" r:id="rId27"/>
-    <p:sldId id="325" r:id="rId28"/>
-    <p:sldId id="316" r:id="rId29"/>
+    <p:sldId id="326" r:id="rId22"/>
+    <p:sldId id="317" r:id="rId23"/>
+    <p:sldId id="318" r:id="rId24"/>
+    <p:sldId id="319" r:id="rId25"/>
+    <p:sldId id="322" r:id="rId26"/>
+    <p:sldId id="323" r:id="rId27"/>
+    <p:sldId id="324" r:id="rId28"/>
+    <p:sldId id="325" r:id="rId29"/>
+    <p:sldId id="327" r:id="rId30"/>
+    <p:sldId id="316" r:id="rId31"/>
   </p:sldIdLst>
   <p:sldSz cx="12192000" cy="6858000"/>
   <p:notesSz cx="6858000" cy="9144000"/>
@@ -159,6 +161,7 @@
             <p14:sldId id="311"/>
             <p14:sldId id="308"/>
             <p14:sldId id="312"/>
+            <p14:sldId id="326"/>
             <p14:sldId id="317"/>
             <p14:sldId id="318"/>
             <p14:sldId id="319"/>
@@ -166,13 +169,14 @@
             <p14:sldId id="323"/>
             <p14:sldId id="324"/>
             <p14:sldId id="325"/>
+            <p14:sldId id="327"/>
             <p14:sldId id="316"/>
           </p14:sldIdLst>
         </p14:section>
       </p14:sectionLst>
     </p:ext>
     <p:ext uri="{EFAFB233-063F-42B5-8137-9DF3F51BA10A}">
-      <p15:sldGuideLst xmlns:p15="http://schemas.microsoft.com/office/powerpoint/2012/main" xmlns="">
+      <p15:sldGuideLst xmlns="" xmlns:p15="http://schemas.microsoft.com/office/powerpoint/2012/main">
         <p15:guide id="1" orient="horz" pos="2160">
           <p15:clr>
             <a:srgbClr val="A4A3A4"/>
@@ -271,7 +275,7 @@
           <a:p>
             <a:fld id="{082E3F05-D987-4841-A5D2-BE3587657B44}" type="datetimeFigureOut">
               <a:rPr lang="en-US" smtClean="0"/>
-              <a:t>8/2/2019</a:t>
+              <a:t>8/3/2019</a:t>
             </a:fld>
             <a:endParaRPr lang="en-US"/>
           </a:p>
@@ -1160,6 +1164,106 @@
           <a:p>
             <a:r>
               <a:rPr lang="en-US" dirty="0" smtClean="0"/>
+              <a:t>Propane,</a:t>
+            </a:r>
+            <a:r>
+              <a:rPr lang="en-US" baseline="0" dirty="0" smtClean="0"/>
+              <a:t> </a:t>
+            </a:r>
+            <a:r>
+              <a:rPr lang="en-US" baseline="0" dirty="0" err="1" smtClean="0"/>
+              <a:t>isobutane</a:t>
+            </a:r>
+            <a:r>
+              <a:rPr lang="en-US" baseline="0" dirty="0" smtClean="0"/>
+              <a:t> etc.</a:t>
+            </a:r>
+            <a:endParaRPr lang="en-US" dirty="0"/>
+          </a:p>
+        </p:txBody>
+      </p:sp>
+      <p:sp>
+        <p:nvSpPr>
+          <p:cNvPr id="4" name="Slide Number Placeholder 3"/>
+          <p:cNvSpPr>
+            <a:spLocks noGrp="1"/>
+          </p:cNvSpPr>
+          <p:nvPr>
+            <p:ph type="sldNum" sz="quarter" idx="10"/>
+          </p:nvPr>
+        </p:nvSpPr>
+        <p:spPr/>
+        <p:txBody>
+          <a:bodyPr/>
+          <a:lstStyle/>
+          <a:p>
+            <a:fld id="{02C18FC1-E41B-4A7F-870D-65A7A02C63B5}" type="slidenum">
+              <a:rPr lang="en-US" smtClean="0"/>
+              <a:t>21</a:t>
+            </a:fld>
+            <a:endParaRPr lang="en-US"/>
+          </a:p>
+        </p:txBody>
+      </p:sp>
+    </p:spTree>
+    <p:extLst>
+      <p:ext uri="{BB962C8B-B14F-4D97-AF65-F5344CB8AC3E}">
+        <p14:creationId xmlns:p14="http://schemas.microsoft.com/office/powerpoint/2010/main" val="4029899611"/>
+      </p:ext>
+    </p:extLst>
+  </p:cSld>
+  <p:clrMapOvr>
+    <a:masterClrMapping/>
+  </p:clrMapOvr>
+</p:notes>
+</file>
+
+<file path=ppt/notesSlides/notesSlide8.xml><?xml version="1.0" encoding="utf-8"?>
+<p:notes xmlns:a="http://schemas.openxmlformats.org/drawingml/2006/main" xmlns:r="http://schemas.openxmlformats.org/officeDocument/2006/relationships" xmlns:p="http://schemas.openxmlformats.org/presentationml/2006/main">
+  <p:cSld>
+    <p:spTree>
+      <p:nvGrpSpPr>
+        <p:cNvPr id="1" name=""/>
+        <p:cNvGrpSpPr/>
+        <p:nvPr/>
+      </p:nvGrpSpPr>
+      <p:grpSpPr>
+        <a:xfrm>
+          <a:off x="0" y="0"/>
+          <a:ext cx="0" cy="0"/>
+          <a:chOff x="0" y="0"/>
+          <a:chExt cx="0" cy="0"/>
+        </a:xfrm>
+      </p:grpSpPr>
+      <p:sp>
+        <p:nvSpPr>
+          <p:cNvPr id="2" name="Slide Image Placeholder 1"/>
+          <p:cNvSpPr>
+            <a:spLocks noGrp="1" noRot="1" noChangeAspect="1"/>
+          </p:cNvSpPr>
+          <p:nvPr>
+            <p:ph type="sldImg"/>
+          </p:nvPr>
+        </p:nvSpPr>
+        <p:spPr/>
+      </p:sp>
+      <p:sp>
+        <p:nvSpPr>
+          <p:cNvPr id="3" name="Notes Placeholder 2"/>
+          <p:cNvSpPr>
+            <a:spLocks noGrp="1"/>
+          </p:cNvSpPr>
+          <p:nvPr>
+            <p:ph type="body" idx="1"/>
+          </p:nvPr>
+        </p:nvSpPr>
+        <p:spPr/>
+        <p:txBody>
+          <a:bodyPr/>
+          <a:lstStyle/>
+          <a:p>
+            <a:r>
+              <a:rPr lang="en-US" dirty="0" smtClean="0"/>
               <a:t>Pull up the GHSP study PGR</a:t>
             </a:r>
             <a:r>
@@ -1187,7 +1291,7 @@
           <a:p>
             <a:fld id="{02C18FC1-E41B-4A7F-870D-65A7A02C63B5}" type="slidenum">
               <a:rPr lang="en-US" smtClean="0"/>
-              <a:t>28</a:t>
+              <a:t>30</a:t>
             </a:fld>
             <a:endParaRPr lang="en-US"/>
           </a:p>
@@ -1467,7 +1571,7 @@
           <a:p>
             <a:fld id="{7D153FBC-B5F8-446E-B066-7BC3A039D2BD}" type="datetimeFigureOut">
               <a:rPr lang="en-US" smtClean="0"/>
-              <a:t>8/2/2019</a:t>
+              <a:t>8/3/2019</a:t>
             </a:fld>
             <a:endParaRPr lang="en-US"/>
           </a:p>
@@ -1752,7 +1856,7 @@
           <a:p>
             <a:fld id="{7D153FBC-B5F8-446E-B066-7BC3A039D2BD}" type="datetimeFigureOut">
               <a:rPr lang="en-US" smtClean="0"/>
-              <a:t>8/2/2019</a:t>
+              <a:t>8/3/2019</a:t>
             </a:fld>
             <a:endParaRPr lang="en-US"/>
           </a:p>
@@ -1960,7 +2064,7 @@
           <a:p>
             <a:fld id="{7D153FBC-B5F8-446E-B066-7BC3A039D2BD}" type="datetimeFigureOut">
               <a:rPr lang="en-US" smtClean="0"/>
-              <a:t>8/2/2019</a:t>
+              <a:t>8/3/2019</a:t>
             </a:fld>
             <a:endParaRPr lang="en-US"/>
           </a:p>
@@ -2168,7 +2272,7 @@
           <a:p>
             <a:fld id="{7D153FBC-B5F8-446E-B066-7BC3A039D2BD}" type="datetimeFigureOut">
               <a:rPr lang="en-US" smtClean="0"/>
-              <a:t>8/2/2019</a:t>
+              <a:t>8/3/2019</a:t>
             </a:fld>
             <a:endParaRPr lang="en-US"/>
           </a:p>
@@ -2267,7 +2371,7 @@
           <p:cNvPr id="2" name="Title 1">
             <a:extLst>
               <a:ext uri="{FF2B5EF4-FFF2-40B4-BE49-F238E27FC236}">
-                <a16:creationId xmlns:a16="http://schemas.microsoft.com/office/drawing/2014/main" xmlns="" id="{49859864-2A42-45F9-8A57-0C0C1E2EF404}"/>
+                <a16:creationId xmlns="" xmlns:a16="http://schemas.microsoft.com/office/drawing/2014/main" id="{49859864-2A42-45F9-8A57-0C0C1E2EF404}"/>
               </a:ext>
             </a:extLst>
           </p:cNvPr>
@@ -2472,7 +2576,7 @@
           <a:p>
             <a:fld id="{7D153FBC-B5F8-446E-B066-7BC3A039D2BD}" type="datetimeFigureOut">
               <a:rPr lang="en-US" smtClean="0"/>
-              <a:t>8/2/2019</a:t>
+              <a:t>8/3/2019</a:t>
             </a:fld>
             <a:endParaRPr lang="en-US"/>
           </a:p>
@@ -2747,7 +2851,7 @@
           <a:p>
             <a:fld id="{7D153FBC-B5F8-446E-B066-7BC3A039D2BD}" type="datetimeFigureOut">
               <a:rPr lang="en-US" smtClean="0"/>
-              <a:t>8/2/2019</a:t>
+              <a:t>8/3/2019</a:t>
             </a:fld>
             <a:endParaRPr lang="en-US"/>
           </a:p>
@@ -3014,7 +3118,7 @@
           <a:p>
             <a:fld id="{7D153FBC-B5F8-446E-B066-7BC3A039D2BD}" type="datetimeFigureOut">
               <a:rPr lang="en-US" smtClean="0"/>
-              <a:t>8/2/2019</a:t>
+              <a:t>8/3/2019</a:t>
             </a:fld>
             <a:endParaRPr lang="en-US"/>
           </a:p>
@@ -3417,7 +3521,7 @@
           <a:p>
             <a:fld id="{7D153FBC-B5F8-446E-B066-7BC3A039D2BD}" type="datetimeFigureOut">
               <a:rPr lang="en-US" smtClean="0"/>
-              <a:t>8/2/2019</a:t>
+              <a:t>8/3/2019</a:t>
             </a:fld>
             <a:endParaRPr lang="en-US"/>
           </a:p>
@@ -3566,7 +3670,7 @@
           <a:p>
             <a:fld id="{7D153FBC-B5F8-446E-B066-7BC3A039D2BD}" type="datetimeFigureOut">
               <a:rPr lang="en-US" smtClean="0"/>
-              <a:t>8/2/2019</a:t>
+              <a:t>8/3/2019</a:t>
             </a:fld>
             <a:endParaRPr lang="en-US"/>
           </a:p>
@@ -3685,7 +3789,7 @@
           <a:p>
             <a:fld id="{7D153FBC-B5F8-446E-B066-7BC3A039D2BD}" type="datetimeFigureOut">
               <a:rPr lang="en-US" smtClean="0"/>
-              <a:t>8/2/2019</a:t>
+              <a:t>8/3/2019</a:t>
             </a:fld>
             <a:endParaRPr lang="en-US"/>
           </a:p>
@@ -3833,7 +3937,7 @@
           <p:cNvPr id="4" name="Picture 3">
             <a:extLst>
               <a:ext uri="{FF2B5EF4-FFF2-40B4-BE49-F238E27FC236}">
-                <a16:creationId xmlns:a16="http://schemas.microsoft.com/office/drawing/2014/main" xmlns="" id="{2454DB67-82BA-4220-9D1A-7E691E5CEC3E}"/>
+                <a16:creationId xmlns="" xmlns:a16="http://schemas.microsoft.com/office/drawing/2014/main" id="{2454DB67-82BA-4220-9D1A-7E691E5CEC3E}"/>
               </a:ext>
             </a:extLst>
           </p:cNvPr>
@@ -4199,7 +4303,7 @@
           <p:cNvPr id="7" name="Picture 6">
             <a:extLst>
               <a:ext uri="{FF2B5EF4-FFF2-40B4-BE49-F238E27FC236}">
-                <a16:creationId xmlns:a16="http://schemas.microsoft.com/office/drawing/2014/main" xmlns="" id="{3726869D-EBBD-4C31-BB27-42C6C5B730E7}"/>
+                <a16:creationId xmlns="" xmlns:a16="http://schemas.microsoft.com/office/drawing/2014/main" id="{3726869D-EBBD-4C31-BB27-42C6C5B730E7}"/>
               </a:ext>
             </a:extLst>
           </p:cNvPr>
@@ -4687,7 +4791,6 @@
               <a:rPr lang="en-US" dirty="0"/>
               <a:t>BCD</a:t>
             </a:r>
-            <a:endParaRPr lang="en-US" dirty="0"/>
           </a:p>
         </p:txBody>
       </p:sp>
@@ -4773,8 +4876,19 @@
           <a:p>
             <a:r>
               <a:rPr lang="en-US" dirty="0" smtClean="0"/>
-              <a:t>Heat capacity</a:t>
-            </a:r>
+              <a:t>Heat </a:t>
+            </a:r>
+            <a:r>
+              <a:rPr lang="en-US" dirty="0" smtClean="0"/>
+              <a:t>capacity</a:t>
+            </a:r>
+          </a:p>
+          <a:p>
+            <a:r>
+              <a:rPr lang="en-US" dirty="0" smtClean="0"/>
+              <a:t>Flammability</a:t>
+            </a:r>
+            <a:endParaRPr lang="en-US" dirty="0" smtClean="0"/>
           </a:p>
           <a:p>
             <a:endParaRPr lang="en-US" dirty="0"/>
@@ -5373,7 +5487,7 @@
           <p:cNvPr id="2" name="Title 1">
             <a:extLst>
               <a:ext uri="{FF2B5EF4-FFF2-40B4-BE49-F238E27FC236}">
-                <a16:creationId xmlns:a16="http://schemas.microsoft.com/office/drawing/2014/main" xmlns="" id="{89D13C01-33D9-46A4-8E99-CC2A2ED40303}"/>
+                <a16:creationId xmlns="" xmlns:a16="http://schemas.microsoft.com/office/drawing/2014/main" id="{89D13C01-33D9-46A4-8E99-CC2A2ED40303}"/>
               </a:ext>
             </a:extLst>
           </p:cNvPr>
@@ -5401,7 +5515,7 @@
           <p:cNvPr id="3" name="Content Placeholder 2">
             <a:extLst>
               <a:ext uri="{FF2B5EF4-FFF2-40B4-BE49-F238E27FC236}">
-                <a16:creationId xmlns:a16="http://schemas.microsoft.com/office/drawing/2014/main" xmlns="" id="{9330BCFD-8A27-4CE2-9559-489A66598E3B}"/>
+                <a16:creationId xmlns="" xmlns:a16="http://schemas.microsoft.com/office/drawing/2014/main" id="{9330BCFD-8A27-4CE2-9559-489A66598E3B}"/>
               </a:ext>
             </a:extLst>
           </p:cNvPr>
@@ -5606,7 +5720,7 @@
           <a:p>
             <a:r>
               <a:rPr lang="en-US" dirty="0" smtClean="0"/>
-              <a:t>Working pressure development</a:t>
+              <a:t>Working fluid selection</a:t>
             </a:r>
             <a:endParaRPr lang="en-US" dirty="0"/>
           </a:p>
@@ -5627,37 +5741,31 @@
           <a:bodyPr/>
           <a:lstStyle/>
           <a:p>
+            <a:pPr marL="0" indent="0">
+              <a:buNone/>
+            </a:pPr>
             <a:r>
               <a:rPr lang="en-US" dirty="0" smtClean="0"/>
-              <a:t>Given a working pressure, and a state of either saturated vapor or saturated liquid, many other properties of a working fluid can be determined</a:t>
-            </a:r>
-          </a:p>
-          <a:p>
-            <a:pPr lvl="1"/>
+              <a:t>Flammability</a:t>
+            </a:r>
+          </a:p>
+          <a:p>
+            <a:pPr marL="0" indent="0">
+              <a:buNone/>
+            </a:pPr>
+            <a:endParaRPr lang="en-US" dirty="0"/>
+          </a:p>
+          <a:p>
+            <a:pPr marL="0" indent="0">
+              <a:buNone/>
+            </a:pPr>
             <a:r>
               <a:rPr lang="en-US" dirty="0" smtClean="0"/>
-              <a:t>Temperature</a:t>
-            </a:r>
-          </a:p>
-          <a:p>
-            <a:pPr lvl="1"/>
+              <a:t>Finally, many of the organic working fluids were ruled out as potential candidates due to the fact that they wer</a:t>
+            </a:r>
             <a:r>
               <a:rPr lang="en-US" dirty="0" smtClean="0"/>
-              <a:t>Enthalpy</a:t>
-            </a:r>
-          </a:p>
-          <a:p>
-            <a:pPr lvl="1"/>
-            <a:r>
-              <a:rPr lang="en-US" dirty="0" smtClean="0"/>
-              <a:t>Entropy</a:t>
-            </a:r>
-          </a:p>
-          <a:p>
-            <a:pPr lvl="1"/>
-            <a:r>
-              <a:rPr lang="en-US" dirty="0" smtClean="0"/>
-              <a:t>Specific volume</a:t>
+              <a:t>e flammable.</a:t>
             </a:r>
             <a:endParaRPr lang="en-US" dirty="0"/>
           </a:p>
@@ -5666,7 +5774,7 @@
     </p:spTree>
     <p:extLst>
       <p:ext uri="{BB962C8B-B14F-4D97-AF65-F5344CB8AC3E}">
-        <p14:creationId xmlns:p14="http://schemas.microsoft.com/office/powerpoint/2010/main" val="2661196445"/>
+        <p14:creationId xmlns:p14="http://schemas.microsoft.com/office/powerpoint/2010/main" val="2501269207"/>
       </p:ext>
     </p:extLst>
   </p:cSld>
@@ -5733,6 +5841,110 @@
           <a:p>
             <a:r>
               <a:rPr lang="en-US" dirty="0" smtClean="0"/>
+              <a:t>Given a working pressure, and a state of either saturated vapor or saturated liquid, many other properties of a working fluid can be determined</a:t>
+            </a:r>
+          </a:p>
+          <a:p>
+            <a:pPr lvl="1"/>
+            <a:r>
+              <a:rPr lang="en-US" dirty="0" smtClean="0"/>
+              <a:t>Temperature</a:t>
+            </a:r>
+          </a:p>
+          <a:p>
+            <a:pPr lvl="1"/>
+            <a:r>
+              <a:rPr lang="en-US" dirty="0" smtClean="0"/>
+              <a:t>Enthalpy</a:t>
+            </a:r>
+          </a:p>
+          <a:p>
+            <a:pPr lvl="1"/>
+            <a:r>
+              <a:rPr lang="en-US" dirty="0" smtClean="0"/>
+              <a:t>Entropy</a:t>
+            </a:r>
+          </a:p>
+          <a:p>
+            <a:pPr lvl="1"/>
+            <a:r>
+              <a:rPr lang="en-US" dirty="0" smtClean="0"/>
+              <a:t>Specific volume</a:t>
+            </a:r>
+            <a:endParaRPr lang="en-US" dirty="0"/>
+          </a:p>
+        </p:txBody>
+      </p:sp>
+    </p:spTree>
+    <p:extLst>
+      <p:ext uri="{BB962C8B-B14F-4D97-AF65-F5344CB8AC3E}">
+        <p14:creationId xmlns:p14="http://schemas.microsoft.com/office/powerpoint/2010/main" val="2661196445"/>
+      </p:ext>
+    </p:extLst>
+  </p:cSld>
+  <p:clrMapOvr>
+    <a:masterClrMapping/>
+  </p:clrMapOvr>
+</p:sld>
+</file>
+
+<file path=ppt/slides/slide23.xml><?xml version="1.0" encoding="utf-8"?>
+<p:sld xmlns:a="http://schemas.openxmlformats.org/drawingml/2006/main" xmlns:r="http://schemas.openxmlformats.org/officeDocument/2006/relationships" xmlns:p="http://schemas.openxmlformats.org/presentationml/2006/main">
+  <p:cSld>
+    <p:spTree>
+      <p:nvGrpSpPr>
+        <p:cNvPr id="1" name=""/>
+        <p:cNvGrpSpPr/>
+        <p:nvPr/>
+      </p:nvGrpSpPr>
+      <p:grpSpPr>
+        <a:xfrm>
+          <a:off x="0" y="0"/>
+          <a:ext cx="0" cy="0"/>
+          <a:chOff x="0" y="0"/>
+          <a:chExt cx="0" cy="0"/>
+        </a:xfrm>
+      </p:grpSpPr>
+      <p:sp>
+        <p:nvSpPr>
+          <p:cNvPr id="2" name="Title 1"/>
+          <p:cNvSpPr>
+            <a:spLocks noGrp="1"/>
+          </p:cNvSpPr>
+          <p:nvPr>
+            <p:ph type="title"/>
+          </p:nvPr>
+        </p:nvSpPr>
+        <p:spPr/>
+        <p:txBody>
+          <a:bodyPr/>
+          <a:lstStyle/>
+          <a:p>
+            <a:r>
+              <a:rPr lang="en-US" dirty="0" smtClean="0"/>
+              <a:t>Working pressure development</a:t>
+            </a:r>
+            <a:endParaRPr lang="en-US" dirty="0"/>
+          </a:p>
+        </p:txBody>
+      </p:sp>
+      <p:sp>
+        <p:nvSpPr>
+          <p:cNvPr id="3" name="Content Placeholder 2"/>
+          <p:cNvSpPr>
+            <a:spLocks noGrp="1"/>
+          </p:cNvSpPr>
+          <p:nvPr>
+            <p:ph idx="1"/>
+          </p:nvPr>
+        </p:nvSpPr>
+        <p:spPr/>
+        <p:txBody>
+          <a:bodyPr/>
+          <a:lstStyle/>
+          <a:p>
+            <a:r>
+              <a:rPr lang="en-US" dirty="0" smtClean="0"/>
               <a:t>Because heat will always transfer from a high heat source to a low heat sink to reach an equilibrium, it is not possible to transfer heat to a cycle if the waste heat temperature is not greater than the working temperature of the boiler.</a:t>
             </a:r>
           </a:p>
@@ -5761,7 +5973,7 @@
 </p:sld>
 </file>
 
-<file path=ppt/slides/slide23.xml><?xml version="1.0" encoding="utf-8"?>
+<file path=ppt/slides/slide24.xml><?xml version="1.0" encoding="utf-8"?>
 <p:sld xmlns:a="http://schemas.openxmlformats.org/drawingml/2006/main" xmlns:r="http://schemas.openxmlformats.org/officeDocument/2006/relationships" xmlns:p="http://schemas.openxmlformats.org/presentationml/2006/main">
   <p:cSld>
     <p:spTree>
@@ -5880,7 +6092,7 @@
 </p:sld>
 </file>
 
-<file path=ppt/slides/slide24.xml><?xml version="1.0" encoding="utf-8"?>
+<file path=ppt/slides/slide25.xml><?xml version="1.0" encoding="utf-8"?>
 <p:sld xmlns:a="http://schemas.openxmlformats.org/drawingml/2006/main" xmlns:r="http://schemas.openxmlformats.org/officeDocument/2006/relationships" xmlns:p="http://schemas.openxmlformats.org/presentationml/2006/main">
   <p:cSld>
     <p:spTree>
@@ -6007,7 +6219,7 @@
 </p:sld>
 </file>
 
-<file path=ppt/slides/slide25.xml><?xml version="1.0" encoding="utf-8"?>
+<file path=ppt/slides/slide26.xml><?xml version="1.0" encoding="utf-8"?>
 <p:sld xmlns:a="http://schemas.openxmlformats.org/drawingml/2006/main" xmlns:r="http://schemas.openxmlformats.org/officeDocument/2006/relationships" xmlns:p="http://schemas.openxmlformats.org/presentationml/2006/main">
   <p:cSld>
     <p:spTree>
@@ -6075,8 +6287,8 @@
           </a:p>
         </p:txBody>
       </p:sp>
-      <mc:AlternateContent xmlns:mc="http://schemas.openxmlformats.org/markup-compatibility/2006">
-        <mc:Choice xmlns:a14="http://schemas.microsoft.com/office/drawing/2010/main" Requires="a14">
+      <mc:AlternateContent xmlns:mc="http://schemas.openxmlformats.org/markup-compatibility/2006" xmlns:a14="http://schemas.microsoft.com/office/drawing/2010/main">
+        <mc:Choice Requires="a14">
           <p:sp>
             <p:nvSpPr>
               <p:cNvPr id="4" name="Rectangle 3"/>
@@ -6098,6 +6310,7 @@
               </a:bodyPr>
               <a:lstStyle/>
               <a:p>
+                <a:pPr/>
                 <a14:m>
                   <m:oMathPara xmlns:m="http://schemas.openxmlformats.org/officeDocument/2006/math">
                     <m:oMathParaPr>
@@ -6108,92 +6321,124 @@
                         <m:rPr>
                           <m:sty m:val="p"/>
                         </m:rPr>
-                        <a:rPr lang="en-US"/>
+                        <a:rPr lang="en-US">
+                          <a:latin typeface="Cambria Math"/>
+                        </a:rPr>
                         <m:t>Δ</m:t>
                       </m:r>
                       <m:sSub>
                         <m:sSubPr>
                           <m:ctrlPr>
-                            <a:rPr lang="en-US" i="1"/>
+                            <a:rPr lang="en-US" i="1">
+                              <a:latin typeface="Cambria Math"/>
+                            </a:rPr>
                           </m:ctrlPr>
                         </m:sSubPr>
                         <m:e>
                           <m:r>
-                            <a:rPr lang="en-US" i="1"/>
+                            <a:rPr lang="en-US" i="1">
+                              <a:latin typeface="Cambria Math"/>
+                            </a:rPr>
                             <m:t>𝑇</m:t>
                           </m:r>
                         </m:e>
                         <m:sub>
                           <m:r>
-                            <a:rPr lang="en-US" i="1"/>
+                            <a:rPr lang="en-US" i="1">
+                              <a:latin typeface="Cambria Math"/>
+                            </a:rPr>
                             <m:t>𝑚</m:t>
                           </m:r>
                         </m:sub>
                       </m:sSub>
                       <m:r>
-                        <a:rPr lang="en-US" i="1"/>
+                        <a:rPr lang="en-US" i="1">
+                          <a:latin typeface="Cambria Math"/>
+                        </a:rPr>
                         <m:t>=</m:t>
                       </m:r>
                       <m:f>
                         <m:fPr>
                           <m:ctrlPr>
-                            <a:rPr lang="en-US" i="1"/>
+                            <a:rPr lang="en-US" i="1">
+                              <a:latin typeface="Cambria Math"/>
+                            </a:rPr>
                           </m:ctrlPr>
                         </m:fPr>
                         <m:num>
                           <m:d>
                             <m:dPr>
                               <m:ctrlPr>
-                                <a:rPr lang="en-US" i="1"/>
+                                <a:rPr lang="en-US" i="1">
+                                  <a:latin typeface="Cambria Math"/>
+                                </a:rPr>
                               </m:ctrlPr>
                             </m:dPr>
                             <m:e>
                               <m:sSub>
                                 <m:sSubPr>
                                   <m:ctrlPr>
-                                    <a:rPr lang="en-US" i="1"/>
+                                    <a:rPr lang="en-US" i="1">
+                                      <a:latin typeface="Cambria Math"/>
+                                    </a:rPr>
                                   </m:ctrlPr>
                                 </m:sSubPr>
                                 <m:e>
                                   <m:r>
-                                    <a:rPr lang="en-US" i="1"/>
+                                    <a:rPr lang="en-US" i="1">
+                                      <a:latin typeface="Cambria Math"/>
+                                    </a:rPr>
                                     <m:t>𝑇</m:t>
                                   </m:r>
                                 </m:e>
                                 <m:sub>
                                   <m:r>
-                                    <a:rPr lang="en-US" i="1"/>
+                                    <a:rPr lang="en-US" i="1">
+                                      <a:latin typeface="Cambria Math"/>
+                                    </a:rPr>
                                     <m:t>h</m:t>
                                   </m:r>
                                   <m:r>
-                                    <a:rPr lang="en-US" i="1"/>
+                                    <a:rPr lang="en-US" i="1">
+                                      <a:latin typeface="Cambria Math"/>
+                                    </a:rPr>
                                     <m:t>2</m:t>
                                   </m:r>
                                 </m:sub>
                               </m:sSub>
                               <m:r>
-                                <a:rPr lang="en-US" i="1"/>
+                                <a:rPr lang="en-US" i="1">
+                                  <a:latin typeface="Cambria Math"/>
+                                </a:rPr>
                                 <m:t>−</m:t>
                               </m:r>
                               <m:sSub>
                                 <m:sSubPr>
                                   <m:ctrlPr>
-                                    <a:rPr lang="en-US" i="1"/>
+                                    <a:rPr lang="en-US" i="1">
+                                      <a:latin typeface="Cambria Math"/>
+                                    </a:rPr>
                                   </m:ctrlPr>
                                 </m:sSubPr>
                                 <m:e>
                                   <m:r>
-                                    <a:rPr lang="en-US" i="1"/>
+                                    <a:rPr lang="en-US" i="1">
+                                      <a:latin typeface="Cambria Math"/>
+                                    </a:rPr>
                                     <m:t>𝑇</m:t>
                                   </m:r>
                                 </m:e>
                                 <m:sub>
                                   <m:r>
-                                    <a:rPr lang="en-US" i="1"/>
+                                    <a:rPr lang="en-US" i="1">
+                                      <a:latin typeface="Cambria Math"/>
+                                    </a:rPr>
                                     <m:t>𝑐</m:t>
                                   </m:r>
                                   <m:r>
-                                    <a:rPr lang="en-US" i="1"/>
+                                    <a:rPr lang="en-US" i="1">
+                                      <a:latin typeface="Cambria Math"/>
+                                    </a:rPr>
                                     <m:t>2</m:t>
                                   </m:r>
                                 </m:sub>
@@ -6201,62 +6446,84 @@
                             </m:e>
                           </m:d>
                           <m:r>
-                            <a:rPr lang="en-US" i="1"/>
+                            <a:rPr lang="en-US" i="1">
+                              <a:latin typeface="Cambria Math"/>
+                            </a:rPr>
                             <m:t>−</m:t>
                           </m:r>
                           <m:d>
                             <m:dPr>
                               <m:ctrlPr>
-                                <a:rPr lang="en-US" i="1"/>
+                                <a:rPr lang="en-US" i="1">
+                                  <a:latin typeface="Cambria Math"/>
+                                </a:rPr>
                               </m:ctrlPr>
                             </m:dPr>
                             <m:e>
                               <m:sSub>
                                 <m:sSubPr>
                                   <m:ctrlPr>
-                                    <a:rPr lang="en-US" i="1"/>
+                                    <a:rPr lang="en-US" i="1">
+                                      <a:latin typeface="Cambria Math"/>
+                                    </a:rPr>
                                   </m:ctrlPr>
                                 </m:sSubPr>
                                 <m:e>
                                   <m:r>
-                                    <a:rPr lang="en-US" i="1"/>
+                                    <a:rPr lang="en-US" i="1">
+                                      <a:latin typeface="Cambria Math"/>
+                                    </a:rPr>
                                     <m:t>𝑇</m:t>
                                   </m:r>
                                 </m:e>
                                 <m:sub>
                                   <m:r>
-                                    <a:rPr lang="en-US" i="1"/>
+                                    <a:rPr lang="en-US" i="1">
+                                      <a:latin typeface="Cambria Math"/>
+                                    </a:rPr>
                                     <m:t>h</m:t>
                                   </m:r>
                                   <m:r>
-                                    <a:rPr lang="en-US" i="1"/>
+                                    <a:rPr lang="en-US" i="1">
+                                      <a:latin typeface="Cambria Math"/>
+                                    </a:rPr>
                                     <m:t>1</m:t>
                                   </m:r>
                                 </m:sub>
                               </m:sSub>
                               <m:r>
-                                <a:rPr lang="en-US" i="1"/>
+                                <a:rPr lang="en-US" i="1">
+                                  <a:latin typeface="Cambria Math"/>
+                                </a:rPr>
                                 <m:t>−</m:t>
                               </m:r>
                               <m:sSub>
                                 <m:sSubPr>
                                   <m:ctrlPr>
-                                    <a:rPr lang="en-US" i="1"/>
+                                    <a:rPr lang="en-US" i="1">
+                                      <a:latin typeface="Cambria Math"/>
+                                    </a:rPr>
                                   </m:ctrlPr>
                                 </m:sSubPr>
                                 <m:e>
                                   <m:r>
-                                    <a:rPr lang="en-US" i="1"/>
+                                    <a:rPr lang="en-US" i="1">
+                                      <a:latin typeface="Cambria Math"/>
+                                    </a:rPr>
                                     <m:t>𝑇</m:t>
                                   </m:r>
                                 </m:e>
                                 <m:sub>
                                   <m:r>
-                                    <a:rPr lang="en-US" i="1"/>
+                                    <a:rPr lang="en-US" i="1">
+                                      <a:latin typeface="Cambria Math"/>
+                                    </a:rPr>
                                     <m:t>𝑐</m:t>
                                   </m:r>
                                   <m:r>
-                                    <a:rPr lang="en-US" i="1"/>
+                                    <a:rPr lang="en-US" i="1">
+                                      <a:latin typeface="Cambria Math"/>
+                                    </a:rPr>
                                     <m:t>1</m:t>
                                   </m:r>
                                 </m:sub>
@@ -6268,7 +6535,9 @@
                           <m:func>
                             <m:funcPr>
                               <m:ctrlPr>
-                                <a:rPr lang="en-US" i="1"/>
+                                <a:rPr lang="en-US" i="1">
+                                  <a:latin typeface="Cambria Math"/>
+                                </a:rPr>
                               </m:ctrlPr>
                             </m:funcPr>
                             <m:fName>
@@ -6276,7 +6545,9 @@
                                 <m:rPr>
                                   <m:sty m:val="p"/>
                                 </m:rPr>
-                                <a:rPr lang="en-US"/>
+                                <a:rPr lang="en-US">
+                                  <a:latin typeface="Cambria Math"/>
+                                </a:rPr>
                                 <m:t>ln</m:t>
                               </m:r>
                             </m:fName>
@@ -6284,63 +6555,85 @@
                               <m:d>
                                 <m:dPr>
                                   <m:ctrlPr>
-                                    <a:rPr lang="en-US" i="1"/>
+                                    <a:rPr lang="en-US" i="1">
+                                      <a:latin typeface="Cambria Math"/>
+                                    </a:rPr>
                                   </m:ctrlPr>
                                 </m:dPr>
                                 <m:e>
                                   <m:f>
                                     <m:fPr>
                                       <m:ctrlPr>
-                                        <a:rPr lang="en-US" i="1"/>
+                                        <a:rPr lang="en-US" i="1">
+                                          <a:latin typeface="Cambria Math"/>
+                                        </a:rPr>
                                       </m:ctrlPr>
                                     </m:fPr>
                                     <m:num>
                                       <m:sSub>
                                         <m:sSubPr>
                                           <m:ctrlPr>
-                                            <a:rPr lang="en-US" i="1"/>
+                                            <a:rPr lang="en-US" i="1">
+                                              <a:latin typeface="Cambria Math"/>
+                                            </a:rPr>
                                           </m:ctrlPr>
                                         </m:sSubPr>
                                         <m:e>
                                           <m:r>
-                                            <a:rPr lang="en-US" i="1"/>
+                                            <a:rPr lang="en-US" i="1">
+                                              <a:latin typeface="Cambria Math"/>
+                                            </a:rPr>
                                             <m:t>𝑇</m:t>
                                           </m:r>
                                         </m:e>
                                         <m:sub>
                                           <m:r>
-                                            <a:rPr lang="en-US" i="1"/>
+                                            <a:rPr lang="en-US" i="1">
+                                              <a:latin typeface="Cambria Math"/>
+                                            </a:rPr>
                                             <m:t>h</m:t>
                                           </m:r>
                                           <m:r>
-                                            <a:rPr lang="en-US" i="1"/>
+                                            <a:rPr lang="en-US" i="1">
+                                              <a:latin typeface="Cambria Math"/>
+                                            </a:rPr>
                                             <m:t>2</m:t>
                                           </m:r>
                                         </m:sub>
                                       </m:sSub>
                                       <m:r>
-                                        <a:rPr lang="en-US" i="1"/>
+                                        <a:rPr lang="en-US" i="1">
+                                          <a:latin typeface="Cambria Math"/>
+                                        </a:rPr>
                                         <m:t>−</m:t>
                                       </m:r>
                                       <m:sSub>
                                         <m:sSubPr>
                                           <m:ctrlPr>
-                                            <a:rPr lang="en-US" i="1"/>
+                                            <a:rPr lang="en-US" i="1">
+                                              <a:latin typeface="Cambria Math"/>
+                                            </a:rPr>
                                           </m:ctrlPr>
                                         </m:sSubPr>
                                         <m:e>
                                           <m:r>
-                                            <a:rPr lang="en-US" i="1"/>
+                                            <a:rPr lang="en-US" i="1">
+                                              <a:latin typeface="Cambria Math"/>
+                                            </a:rPr>
                                             <m:t>𝑇</m:t>
                                           </m:r>
                                         </m:e>
                                         <m:sub>
                                           <m:r>
-                                            <a:rPr lang="en-US" i="1"/>
+                                            <a:rPr lang="en-US" i="1">
+                                              <a:latin typeface="Cambria Math"/>
+                                            </a:rPr>
                                             <m:t>𝑐</m:t>
                                           </m:r>
                                           <m:r>
-                                            <a:rPr lang="en-US" i="1"/>
+                                            <a:rPr lang="en-US" i="1">
+                                              <a:latin typeface="Cambria Math"/>
+                                            </a:rPr>
                                             <m:t>2</m:t>
                                           </m:r>
                                         </m:sub>
@@ -6350,49 +6643,67 @@
                                       <m:sSub>
                                         <m:sSubPr>
                                           <m:ctrlPr>
-                                            <a:rPr lang="en-US" i="1"/>
+                                            <a:rPr lang="en-US" i="1">
+                                              <a:latin typeface="Cambria Math"/>
+                                            </a:rPr>
                                           </m:ctrlPr>
                                         </m:sSubPr>
                                         <m:e>
                                           <m:r>
-                                            <a:rPr lang="en-US" i="1"/>
+                                            <a:rPr lang="en-US" i="1">
+                                              <a:latin typeface="Cambria Math"/>
+                                            </a:rPr>
                                             <m:t>𝑇</m:t>
                                           </m:r>
                                         </m:e>
                                         <m:sub>
                                           <m:r>
-                                            <a:rPr lang="en-US" i="1"/>
+                                            <a:rPr lang="en-US" i="1">
+                                              <a:latin typeface="Cambria Math"/>
+                                            </a:rPr>
                                             <m:t>h</m:t>
                                           </m:r>
                                           <m:r>
-                                            <a:rPr lang="en-US" i="1"/>
+                                            <a:rPr lang="en-US" i="1">
+                                              <a:latin typeface="Cambria Math"/>
+                                            </a:rPr>
                                             <m:t>1</m:t>
                                           </m:r>
                                         </m:sub>
                                       </m:sSub>
                                       <m:r>
-                                        <a:rPr lang="en-US" i="1"/>
+                                        <a:rPr lang="en-US" i="1">
+                                          <a:latin typeface="Cambria Math"/>
+                                        </a:rPr>
                                         <m:t>−</m:t>
                                       </m:r>
                                       <m:sSub>
                                         <m:sSubPr>
                                           <m:ctrlPr>
-                                            <a:rPr lang="en-US" i="1"/>
+                                            <a:rPr lang="en-US" i="1">
+                                              <a:latin typeface="Cambria Math"/>
+                                            </a:rPr>
                                           </m:ctrlPr>
                                         </m:sSubPr>
                                         <m:e>
                                           <m:r>
-                                            <a:rPr lang="en-US" i="1"/>
+                                            <a:rPr lang="en-US" i="1">
+                                              <a:latin typeface="Cambria Math"/>
+                                            </a:rPr>
                                             <m:t>𝑇</m:t>
                                           </m:r>
                                         </m:e>
                                         <m:sub>
                                           <m:r>
-                                            <a:rPr lang="en-US" i="1"/>
+                                            <a:rPr lang="en-US" i="1">
+                                              <a:latin typeface="Cambria Math"/>
+                                            </a:rPr>
                                             <m:t>𝑐</m:t>
                                           </m:r>
                                           <m:r>
-                                            <a:rPr lang="en-US" i="1"/>
+                                            <a:rPr lang="en-US" i="1">
+                                              <a:latin typeface="Cambria Math"/>
+                                            </a:rPr>
                                             <m:t>1</m:t>
                                           </m:r>
                                         </m:sub>
@@ -6413,7 +6724,7 @@
             </p:txBody>
           </p:sp>
         </mc:Choice>
-        <mc:Fallback>
+        <mc:Fallback xmlns="">
           <p:sp>
             <p:nvSpPr>
               <p:cNvPr id="4" name="Rectangle 3"/>
@@ -6465,7 +6776,7 @@
 </p:sld>
 </file>
 
-<file path=ppt/slides/slide26.xml><?xml version="1.0" encoding="utf-8"?>
+<file path=ppt/slides/slide27.xml><?xml version="1.0" encoding="utf-8"?>
 <p:sld xmlns:a="http://schemas.openxmlformats.org/drawingml/2006/main" xmlns:r="http://schemas.openxmlformats.org/officeDocument/2006/relationships" xmlns:p="http://schemas.openxmlformats.org/presentationml/2006/main">
   <p:cSld>
     <p:spTree>
@@ -6533,8 +6844,8 @@
           </a:p>
         </p:txBody>
       </p:sp>
-      <mc:AlternateContent xmlns:mc="http://schemas.openxmlformats.org/markup-compatibility/2006">
-        <mc:Choice xmlns:a14="http://schemas.microsoft.com/office/drawing/2010/main" Requires="a14">
+      <mc:AlternateContent xmlns:mc="http://schemas.openxmlformats.org/markup-compatibility/2006" xmlns:a14="http://schemas.microsoft.com/office/drawing/2010/main">
+        <mc:Choice Requires="a14">
           <p:sp>
             <p:nvSpPr>
               <p:cNvPr id="5" name="Rectangle 4"/>
@@ -6556,6 +6867,7 @@
               </a:bodyPr>
               <a:lstStyle/>
               <a:p>
+                <a:pPr/>
                 <a14:m>
                   <m:oMathPara xmlns:m="http://schemas.openxmlformats.org/officeDocument/2006/math">
                     <m:oMathParaPr>
@@ -6566,35 +6878,47 @@
                         <m:rPr>
                           <m:sty m:val="p"/>
                         </m:rPr>
-                        <a:rPr lang="en-US"/>
+                        <a:rPr lang="en-US">
+                          <a:latin typeface="Cambria Math"/>
+                        </a:rPr>
                         <m:t>q</m:t>
                       </m:r>
                       <m:r>
-                        <a:rPr lang="en-US"/>
+                        <a:rPr lang="en-US">
+                          <a:latin typeface="Cambria Math"/>
+                        </a:rPr>
                         <m:t>=</m:t>
                       </m:r>
                       <m:r>
                         <m:rPr>
                           <m:sty m:val="p"/>
                         </m:rPr>
-                        <a:rPr lang="en-US"/>
+                        <a:rPr lang="en-US">
+                          <a:latin typeface="Cambria Math"/>
+                        </a:rPr>
                         <m:t>UAΔ</m:t>
                       </m:r>
                       <m:sSub>
                         <m:sSubPr>
                           <m:ctrlPr>
-                            <a:rPr lang="en-US" i="1"/>
+                            <a:rPr lang="en-US" i="1">
+                              <a:latin typeface="Cambria Math"/>
+                            </a:rPr>
                           </m:ctrlPr>
                         </m:sSubPr>
                         <m:e>
                           <m:r>
-                            <a:rPr lang="en-US" i="1"/>
+                            <a:rPr lang="en-US" i="1">
+                              <a:latin typeface="Cambria Math"/>
+                            </a:rPr>
                             <m:t>𝑇</m:t>
                           </m:r>
                         </m:e>
                         <m:sub>
                           <m:r>
-                            <a:rPr lang="en-US" i="1"/>
+                            <a:rPr lang="en-US" i="1">
+                              <a:latin typeface="Cambria Math"/>
+                            </a:rPr>
                             <m:t>𝑚</m:t>
                           </m:r>
                         </m:sub>
@@ -6607,7 +6931,7 @@
             </p:txBody>
           </p:sp>
         </mc:Choice>
-        <mc:Fallback>
+        <mc:Fallback xmlns="">
           <p:sp>
             <p:nvSpPr>
               <p:cNvPr id="5" name="Rectangle 4"/>
@@ -6659,7 +6983,7 @@
 </p:sld>
 </file>
 
-<file path=ppt/slides/slide27.xml><?xml version="1.0" encoding="utf-8"?>
+<file path=ppt/slides/slide28.xml><?xml version="1.0" encoding="utf-8"?>
 <p:sld xmlns:a="http://schemas.openxmlformats.org/drawingml/2006/main" xmlns:r="http://schemas.openxmlformats.org/officeDocument/2006/relationships" xmlns:p="http://schemas.openxmlformats.org/presentationml/2006/main">
   <p:cSld>
     <p:spTree>
@@ -6727,8 +7051,8 @@
           </a:p>
         </p:txBody>
       </p:sp>
-      <mc:AlternateContent xmlns:mc="http://schemas.openxmlformats.org/markup-compatibility/2006">
-        <mc:Choice xmlns:a14="http://schemas.microsoft.com/office/drawing/2010/main" Requires="a14">
+      <mc:AlternateContent xmlns:mc="http://schemas.openxmlformats.org/markup-compatibility/2006" xmlns:a14="http://schemas.microsoft.com/office/drawing/2010/main">
+        <mc:Choice Requires="a14">
           <p:sp>
             <p:nvSpPr>
               <p:cNvPr id="4" name="Rectangle 3"/>
@@ -6750,6 +7074,7 @@
               </a:bodyPr>
               <a:lstStyle/>
               <a:p>
+                <a:pPr/>
                 <a14:m>
                   <m:oMathPara xmlns:m="http://schemas.openxmlformats.org/officeDocument/2006/math">
                     <m:oMathParaPr>
@@ -6759,12 +7084,16 @@
                       <m:sSup>
                         <m:sSupPr>
                           <m:ctrlPr>
-                            <a:rPr lang="en-US" i="1"/>
+                            <a:rPr lang="en-US" i="1">
+                              <a:latin typeface="Cambria Math"/>
+                            </a:rPr>
                           </m:ctrlPr>
                         </m:sSupPr>
                         <m:e>
                           <m:r>
-                            <a:rPr lang="en-US"/>
+                            <a:rPr lang="en-US">
+                              <a:latin typeface="Cambria Math"/>
+                            </a:rPr>
                             <m:t>9.1395</m:t>
                           </m:r>
                         </m:e>
@@ -6773,144 +7102,194 @@
                             <m:rPr>
                               <m:sty m:val="p"/>
                             </m:rPr>
-                            <a:rPr lang="en-US"/>
+                            <a:rPr lang="en-US">
+                              <a:latin typeface="Cambria Math"/>
+                            </a:rPr>
                             <m:t>o</m:t>
                           </m:r>
                         </m:sup>
                       </m:sSup>
                       <m:r>
-                        <a:rPr lang="en-US" i="1"/>
+                        <a:rPr lang="en-US" i="1">
+                          <a:latin typeface="Cambria Math"/>
+                        </a:rPr>
                         <m:t>𝐶</m:t>
                       </m:r>
                       <m:r>
-                        <a:rPr lang="en-US" i="1"/>
+                        <a:rPr lang="en-US" i="1">
+                          <a:latin typeface="Cambria Math"/>
+                        </a:rPr>
                         <m:t>=</m:t>
                       </m:r>
                       <m:f>
                         <m:fPr>
                           <m:ctrlPr>
-                            <a:rPr lang="en-US" i="1"/>
+                            <a:rPr lang="en-US" i="1">
+                              <a:latin typeface="Cambria Math"/>
+                            </a:rPr>
                           </m:ctrlPr>
                         </m:fPr>
                         <m:num>
                           <m:d>
                             <m:dPr>
                               <m:ctrlPr>
-                                <a:rPr lang="en-US" i="1"/>
+                                <a:rPr lang="en-US" i="1">
+                                  <a:latin typeface="Cambria Math"/>
+                                </a:rPr>
                               </m:ctrlPr>
                             </m:dPr>
                             <m:e>
                               <m:sSup>
                                 <m:sSupPr>
                                   <m:ctrlPr>
-                                    <a:rPr lang="en-US" i="1"/>
+                                    <a:rPr lang="en-US" i="1">
+                                      <a:latin typeface="Cambria Math"/>
+                                    </a:rPr>
                                   </m:ctrlPr>
                                 </m:sSupPr>
                                 <m:e>
                                   <m:r>
-                                    <a:rPr lang="en-US" i="1"/>
+                                    <a:rPr lang="en-US" i="1">
+                                      <a:latin typeface="Cambria Math"/>
+                                    </a:rPr>
                                     <m:t>42.4233</m:t>
                                   </m:r>
                                 </m:e>
                                 <m:sup>
                                   <m:r>
-                                    <a:rPr lang="en-US" i="1"/>
+                                    <a:rPr lang="en-US" i="1">
+                                      <a:latin typeface="Cambria Math"/>
+                                    </a:rPr>
                                     <m:t>𝑜</m:t>
                                   </m:r>
                                 </m:sup>
                               </m:sSup>
                               <m:r>
-                                <a:rPr lang="en-US" i="1"/>
+                                <a:rPr lang="en-US" i="1">
+                                  <a:latin typeface="Cambria Math"/>
+                                </a:rPr>
                                 <m:t>𝐶</m:t>
                               </m:r>
                               <m:r>
-                                <a:rPr lang="en-US" i="1"/>
+                                <a:rPr lang="en-US" i="1">
+                                  <a:latin typeface="Cambria Math"/>
+                                </a:rPr>
                                 <m:t>−</m:t>
                               </m:r>
                               <m:sSup>
                                 <m:sSupPr>
                                   <m:ctrlPr>
-                                    <a:rPr lang="en-US" i="1"/>
+                                    <a:rPr lang="en-US" i="1">
+                                      <a:latin typeface="Cambria Math"/>
+                                    </a:rPr>
                                   </m:ctrlPr>
                                 </m:sSupPr>
                                 <m:e>
                                   <m:r>
-                                    <a:rPr lang="en-US" i="1"/>
+                                    <a:rPr lang="en-US" i="1">
+                                      <a:latin typeface="Cambria Math"/>
+                                    </a:rPr>
                                     <m:t>42.29</m:t>
                                   </m:r>
                                 </m:e>
                                 <m:sup>
                                   <m:r>
-                                    <a:rPr lang="en-US" i="1"/>
+                                    <a:rPr lang="en-US" i="1">
+                                      <a:latin typeface="Cambria Math"/>
+                                    </a:rPr>
                                     <m:t>𝑜</m:t>
                                   </m:r>
                                 </m:sup>
                               </m:sSup>
                               <m:r>
-                                <a:rPr lang="en-US" i="1"/>
+                                <a:rPr lang="en-US" i="1">
+                                  <a:latin typeface="Cambria Math"/>
+                                </a:rPr>
                                 <m:t>𝐶</m:t>
                               </m:r>
                             </m:e>
                           </m:d>
                           <m:r>
-                            <a:rPr lang="en-US" i="1"/>
+                            <a:rPr lang="en-US" i="1">
+                              <a:latin typeface="Cambria Math"/>
+                            </a:rPr>
                             <m:t>−</m:t>
                           </m:r>
                           <m:d>
                             <m:dPr>
                               <m:ctrlPr>
-                                <a:rPr lang="en-US" i="1"/>
+                                <a:rPr lang="en-US" i="1">
+                                  <a:latin typeface="Cambria Math"/>
+                                </a:rPr>
                               </m:ctrlPr>
                             </m:dPr>
                             <m:e>
                               <m:sSup>
                                 <m:sSupPr>
                                   <m:ctrlPr>
-                                    <a:rPr lang="en-US" i="1"/>
+                                    <a:rPr lang="en-US" i="1">
+                                      <a:latin typeface="Cambria Math"/>
+                                    </a:rPr>
                                   </m:ctrlPr>
                                 </m:sSupPr>
                                 <m:e>
                                   <m:r>
-                                    <a:rPr lang="en-US" i="1"/>
+                                    <a:rPr lang="en-US" i="1">
+                                      <a:latin typeface="Cambria Math"/>
+                                    </a:rPr>
                                     <m:t>97.5</m:t>
                                   </m:r>
                                 </m:e>
                                 <m:sup>
                                   <m:r>
-                                    <a:rPr lang="en-US" i="1"/>
+                                    <a:rPr lang="en-US" i="1">
+                                      <a:latin typeface="Cambria Math"/>
+                                    </a:rPr>
                                     <m:t>𝑜</m:t>
                                   </m:r>
                                 </m:sup>
                               </m:sSup>
                               <m:r>
-                                <a:rPr lang="en-US" i="1"/>
+                                <a:rPr lang="en-US" i="1">
+                                  <a:latin typeface="Cambria Math"/>
+                                </a:rPr>
                                 <m:t>𝐶</m:t>
                               </m:r>
                               <m:r>
-                                <a:rPr lang="en-US" i="1"/>
+                                <a:rPr lang="en-US" i="1">
+                                  <a:latin typeface="Cambria Math"/>
+                                </a:rPr>
                                 <m:t>−</m:t>
                               </m:r>
                               <m:sSup>
                                 <m:sSupPr>
                                   <m:ctrlPr>
-                                    <a:rPr lang="en-US" i="1"/>
+                                    <a:rPr lang="en-US" i="1">
+                                      <a:latin typeface="Cambria Math"/>
+                                    </a:rPr>
                                   </m:ctrlPr>
                                 </m:sSupPr>
                                 <m:e>
                                   <m:r>
-                                    <a:rPr lang="en-US" i="1"/>
+                                    <a:rPr lang="en-US" i="1">
+                                      <a:latin typeface="Cambria Math"/>
+                                    </a:rPr>
                                     <m:t>42.29</m:t>
                                   </m:r>
                                 </m:e>
                                 <m:sup>
                                   <m:r>
-                                    <a:rPr lang="en-US" i="1"/>
+                                    <a:rPr lang="en-US" i="1">
+                                      <a:latin typeface="Cambria Math"/>
+                                    </a:rPr>
                                     <m:t>𝑜</m:t>
                                   </m:r>
                                 </m:sup>
                               </m:sSup>
                               <m:r>
-                                <a:rPr lang="en-US" i="1"/>
+                                <a:rPr lang="en-US" i="1">
+                                  <a:latin typeface="Cambria Math"/>
+                                </a:rPr>
                                 <m:t>𝐶</m:t>
                               </m:r>
                             </m:e>
@@ -6921,72 +7300,98 @@
                             <m:rPr>
                               <m:sty m:val="p"/>
                             </m:rPr>
-                            <a:rPr lang="en-US"/>
+                            <a:rPr lang="en-US">
+                              <a:latin typeface="Cambria Math"/>
+                            </a:rPr>
                             <m:t>ln</m:t>
                           </m:r>
                           <m:r>
-                            <a:rPr lang="en-US"/>
+                            <a:rPr lang="en-US">
+                              <a:latin typeface="Cambria Math"/>
+                            </a:rPr>
                             <m:t>⁡</m:t>
                           </m:r>
                           <m:r>
-                            <a:rPr lang="en-US" i="1"/>
+                            <a:rPr lang="en-US" i="1">
+                              <a:latin typeface="Cambria Math"/>
+                            </a:rPr>
                             <m:t>[</m:t>
                           </m:r>
                           <m:f>
                             <m:fPr>
                               <m:ctrlPr>
-                                <a:rPr lang="en-US" i="1"/>
+                                <a:rPr lang="en-US" i="1">
+                                  <a:latin typeface="Cambria Math"/>
+                                </a:rPr>
                               </m:ctrlPr>
                             </m:fPr>
                             <m:num>
                               <m:sSup>
                                 <m:sSupPr>
                                   <m:ctrlPr>
-                                    <a:rPr lang="en-US" i="1"/>
+                                    <a:rPr lang="en-US" i="1">
+                                      <a:latin typeface="Cambria Math"/>
+                                    </a:rPr>
                                   </m:ctrlPr>
                                 </m:sSupPr>
                                 <m:e>
                                   <m:r>
-                                    <a:rPr lang="en-US" i="1"/>
+                                    <a:rPr lang="en-US" i="1">
+                                      <a:latin typeface="Cambria Math"/>
+                                    </a:rPr>
                                     <m:t>42.4233</m:t>
                                   </m:r>
                                 </m:e>
                                 <m:sup>
                                   <m:r>
-                                    <a:rPr lang="en-US" i="1"/>
+                                    <a:rPr lang="en-US" i="1">
+                                      <a:latin typeface="Cambria Math"/>
+                                    </a:rPr>
                                     <m:t>𝑜</m:t>
                                   </m:r>
                                 </m:sup>
                               </m:sSup>
                               <m:r>
-                                <a:rPr lang="en-US" i="1"/>
+                                <a:rPr lang="en-US" i="1">
+                                  <a:latin typeface="Cambria Math"/>
+                                </a:rPr>
                                 <m:t>𝐶</m:t>
                               </m:r>
                               <m:r>
-                                <a:rPr lang="en-US" i="1"/>
+                                <a:rPr lang="en-US" i="1">
+                                  <a:latin typeface="Cambria Math"/>
+                                </a:rPr>
                                 <m:t>−</m:t>
                               </m:r>
                               <m:sSup>
                                 <m:sSupPr>
                                   <m:ctrlPr>
-                                    <a:rPr lang="en-US" i="1"/>
+                                    <a:rPr lang="en-US" i="1">
+                                      <a:latin typeface="Cambria Math"/>
+                                    </a:rPr>
                                   </m:ctrlPr>
                                 </m:sSupPr>
                                 <m:e>
                                   <m:r>
-                                    <a:rPr lang="en-US" i="1"/>
+                                    <a:rPr lang="en-US" i="1">
+                                      <a:latin typeface="Cambria Math"/>
+                                    </a:rPr>
                                     <m:t>42.29</m:t>
                                   </m:r>
                                 </m:e>
                                 <m:sup>
                                   <m:r>
-                                    <a:rPr lang="en-US" i="1"/>
+                                    <a:rPr lang="en-US" i="1">
+                                      <a:latin typeface="Cambria Math"/>
+                                    </a:rPr>
                                     <m:t>𝑜</m:t>
                                   </m:r>
                                 </m:sup>
                               </m:sSup>
                               <m:r>
-                                <a:rPr lang="en-US" i="1"/>
+                                <a:rPr lang="en-US" i="1">
+                                  <a:latin typeface="Cambria Math"/>
+                                </a:rPr>
                                 <m:t>𝐶</m:t>
                               </m:r>
                             </m:num>
@@ -6994,57 +7399,77 @@
                               <m:sSup>
                                 <m:sSupPr>
                                   <m:ctrlPr>
-                                    <a:rPr lang="en-US" i="1"/>
+                                    <a:rPr lang="en-US" i="1">
+                                      <a:latin typeface="Cambria Math"/>
+                                    </a:rPr>
                                   </m:ctrlPr>
                                 </m:sSupPr>
                                 <m:e>
                                   <m:r>
-                                    <a:rPr lang="en-US" i="1"/>
+                                    <a:rPr lang="en-US" i="1">
+                                      <a:latin typeface="Cambria Math"/>
+                                    </a:rPr>
                                     <m:t>97.5</m:t>
                                   </m:r>
                                 </m:e>
                                 <m:sup>
                                   <m:r>
-                                    <a:rPr lang="en-US" i="1"/>
+                                    <a:rPr lang="en-US" i="1">
+                                      <a:latin typeface="Cambria Math"/>
+                                    </a:rPr>
                                     <m:t>𝑜</m:t>
                                   </m:r>
                                 </m:sup>
                               </m:sSup>
                               <m:r>
-                                <a:rPr lang="en-US" i="1"/>
+                                <a:rPr lang="en-US" i="1">
+                                  <a:latin typeface="Cambria Math"/>
+                                </a:rPr>
                                 <m:t>𝐶</m:t>
                               </m:r>
                               <m:r>
-                                <a:rPr lang="en-US" i="1"/>
+                                <a:rPr lang="en-US" i="1">
+                                  <a:latin typeface="Cambria Math"/>
+                                </a:rPr>
                                 <m:t>−</m:t>
                               </m:r>
                               <m:sSup>
                                 <m:sSupPr>
                                   <m:ctrlPr>
-                                    <a:rPr lang="en-US" i="1"/>
+                                    <a:rPr lang="en-US" i="1">
+                                      <a:latin typeface="Cambria Math"/>
+                                    </a:rPr>
                                   </m:ctrlPr>
                                 </m:sSupPr>
                                 <m:e>
                                   <m:r>
-                                    <a:rPr lang="en-US" i="1"/>
+                                    <a:rPr lang="en-US" i="1">
+                                      <a:latin typeface="Cambria Math"/>
+                                    </a:rPr>
                                     <m:t>42.29</m:t>
                                   </m:r>
                                 </m:e>
                                 <m:sup>
                                   <m:r>
-                                    <a:rPr lang="en-US" i="1"/>
+                                    <a:rPr lang="en-US" i="1">
+                                      <a:latin typeface="Cambria Math"/>
+                                    </a:rPr>
                                     <m:t>𝑜</m:t>
                                   </m:r>
                                 </m:sup>
                               </m:sSup>
                               <m:r>
-                                <a:rPr lang="en-US" i="1"/>
+                                <a:rPr lang="en-US" i="1">
+                                  <a:latin typeface="Cambria Math"/>
+                                </a:rPr>
                                 <m:t>𝐶</m:t>
                               </m:r>
                             </m:den>
                           </m:f>
                           <m:r>
-                            <a:rPr lang="en-US" i="1"/>
+                            <a:rPr lang="en-US" i="1">
+                              <a:latin typeface="Cambria Math"/>
+                            </a:rPr>
                             <m:t>]</m:t>
                           </m:r>
                         </m:den>
@@ -7057,7 +7482,7 @@
             </p:txBody>
           </p:sp>
         </mc:Choice>
-        <mc:Fallback>
+        <mc:Fallback xmlns="">
           <p:sp>
             <p:nvSpPr>
               <p:cNvPr id="4" name="Rectangle 3"/>
@@ -7096,8 +7521,8 @@
           </p:sp>
         </mc:Fallback>
       </mc:AlternateContent>
-      <mc:AlternateContent xmlns:mc="http://schemas.openxmlformats.org/markup-compatibility/2006">
-        <mc:Choice xmlns:a14="http://schemas.microsoft.com/office/drawing/2010/main" Requires="a14">
+      <mc:AlternateContent xmlns:mc="http://schemas.openxmlformats.org/markup-compatibility/2006" xmlns:a14="http://schemas.microsoft.com/office/drawing/2010/main">
+        <mc:Choice Requires="a14">
           <p:sp>
             <p:nvSpPr>
               <p:cNvPr id="6" name="Rectangle 5"/>
@@ -7119,6 +7544,7 @@
               </a:bodyPr>
               <a:lstStyle/>
               <a:p>
+                <a:pPr/>
                 <a14:m>
                   <m:oMathPara xmlns:m="http://schemas.openxmlformats.org/officeDocument/2006/math">
                     <m:oMathParaPr>
@@ -7126,47 +7552,63 @@
                     </m:oMathParaPr>
                     <m:oMath xmlns:m="http://schemas.openxmlformats.org/officeDocument/2006/math">
                       <m:r>
-                        <a:rPr lang="en-US" i="1"/>
+                        <a:rPr lang="en-US" i="1">
+                          <a:latin typeface="Cambria Math"/>
+                        </a:rPr>
                         <m:t>247.02</m:t>
                       </m:r>
                       <m:sSup>
                         <m:sSupPr>
                           <m:ctrlPr>
-                            <a:rPr lang="en-US" i="1"/>
+                            <a:rPr lang="en-US" i="1">
+                              <a:latin typeface="Cambria Math"/>
+                            </a:rPr>
                           </m:ctrlPr>
                         </m:sSupPr>
                         <m:e>
                           <m:r>
-                            <a:rPr lang="en-US" i="1"/>
+                            <a:rPr lang="en-US" i="1">
+                              <a:latin typeface="Cambria Math"/>
+                            </a:rPr>
                             <m:t>𝑚</m:t>
                           </m:r>
                         </m:e>
                         <m:sup>
                           <m:r>
-                            <a:rPr lang="en-US" i="1"/>
+                            <a:rPr lang="en-US" i="1">
+                              <a:latin typeface="Cambria Math"/>
+                            </a:rPr>
                             <m:t>2</m:t>
                           </m:r>
                         </m:sup>
                       </m:sSup>
                       <m:r>
-                        <a:rPr lang="en-US" i="1"/>
+                        <a:rPr lang="en-US" i="1">
+                          <a:latin typeface="Cambria Math"/>
+                        </a:rPr>
                         <m:t>=</m:t>
                       </m:r>
                       <m:f>
                         <m:fPr>
                           <m:ctrlPr>
-                            <a:rPr lang="en-US" i="1"/>
+                            <a:rPr lang="en-US" i="1">
+                              <a:latin typeface="Cambria Math"/>
+                            </a:rPr>
                           </m:ctrlPr>
                         </m:fPr>
                         <m:num>
                           <m:r>
-                            <a:rPr lang="en-US" i="1"/>
+                            <a:rPr lang="en-US" i="1">
+                              <a:latin typeface="Cambria Math"/>
+                            </a:rPr>
                             <m:t>248.34</m:t>
                           </m:r>
                         </m:num>
                         <m:den>
                           <m:r>
-                            <a:rPr lang="en-US" i="1"/>
+                            <a:rPr lang="en-US" i="1">
+                              <a:latin typeface="Cambria Math"/>
+                            </a:rPr>
                             <m:t>0.110∗9.1395</m:t>
                           </m:r>
                         </m:den>
@@ -7179,7 +7621,7 @@
             </p:txBody>
           </p:sp>
         </mc:Choice>
-        <mc:Fallback>
+        <mc:Fallback xmlns="">
           <p:sp>
             <p:nvSpPr>
               <p:cNvPr id="6" name="Rectangle 5"/>
@@ -7231,7 +7673,7 @@
 </p:sld>
 </file>
 
-<file path=ppt/slides/slide28.xml><?xml version="1.0" encoding="utf-8"?>
+<file path=ppt/slides/slide29.xml><?xml version="1.0" encoding="utf-8"?>
 <p:sld xmlns:a="http://schemas.openxmlformats.org/drawingml/2006/main" xmlns:r="http://schemas.openxmlformats.org/officeDocument/2006/relationships" xmlns:p="http://schemas.openxmlformats.org/presentationml/2006/main">
   <p:cSld>
     <p:spTree>
@@ -7265,39 +7707,585 @@
           <a:p>
             <a:r>
               <a:rPr lang="en-US" dirty="0" smtClean="0"/>
-              <a:t>Conclusion</a:t>
+              <a:t>Heat exchangers</a:t>
             </a:r>
             <a:endParaRPr lang="en-US" dirty="0"/>
           </a:p>
         </p:txBody>
       </p:sp>
-      <p:sp>
-        <p:nvSpPr>
-          <p:cNvPr id="3" name="Content Placeholder 2"/>
-          <p:cNvSpPr>
-            <a:spLocks noGrp="1"/>
-          </p:cNvSpPr>
-          <p:nvPr>
-            <p:ph idx="1"/>
-          </p:nvPr>
-        </p:nvSpPr>
-        <p:spPr/>
-        <p:txBody>
-          <a:bodyPr/>
-          <a:lstStyle/>
-          <a:p>
-            <a:r>
-              <a:rPr lang="en-US" dirty="0" smtClean="0"/>
-              <a:t>It was apparent at this stage of the project that the heat available was too little, and that heat exchanger size requirements were prohibitively large.</a:t>
-            </a:r>
-            <a:endParaRPr lang="en-US" dirty="0"/>
-          </a:p>
-        </p:txBody>
-      </p:sp>
+      <p:graphicFrame>
+        <p:nvGraphicFramePr>
+          <p:cNvPr id="7" name="Table 6"/>
+          <p:cNvGraphicFramePr>
+            <a:graphicFrameLocks noGrp="1"/>
+          </p:cNvGraphicFramePr>
+          <p:nvPr>
+            <p:extLst>
+              <p:ext uri="{D42A27DB-BD31-4B8C-83A1-F6EECF244321}">
+                <p14:modId xmlns:p14="http://schemas.microsoft.com/office/powerpoint/2010/main" val="2803862650"/>
+              </p:ext>
+            </p:extLst>
+          </p:nvPr>
+        </p:nvGraphicFramePr>
+        <p:xfrm>
+          <a:off x="2442029" y="1183118"/>
+          <a:ext cx="7534728" cy="4389120"/>
+        </p:xfrm>
+        <a:graphic>
+          <a:graphicData uri="http://schemas.openxmlformats.org/drawingml/2006/table">
+            <a:tbl>
+              <a:tblPr firstRow="1" firstCol="1" bandRow="1">
+                <a:tableStyleId>{5C22544A-7EE6-4342-B048-85BDC9FD1C3A}</a:tableStyleId>
+              </a:tblPr>
+              <a:tblGrid>
+                <a:gridCol w="3124156"/>
+                <a:gridCol w="2205286"/>
+                <a:gridCol w="2205286"/>
+              </a:tblGrid>
+              <a:tr h="190500">
+                <a:tc>
+                  <a:txBody>
+                    <a:bodyPr/>
+                    <a:lstStyle/>
+                    <a:p>
+                      <a:pPr marL="0" marR="0" algn="l">
+                        <a:lnSpc>
+                          <a:spcPct val="200000"/>
+                        </a:lnSpc>
+                        <a:spcBef>
+                          <a:spcPts val="0"/>
+                        </a:spcBef>
+                        <a:spcAft>
+                          <a:spcPts val="0"/>
+                        </a:spcAft>
+                      </a:pPr>
+                      <a:r>
+                        <a:rPr lang="en-US" sz="2400" dirty="0">
+                          <a:effectLst/>
+                        </a:rPr>
+                        <a:t>Tube length</a:t>
+                      </a:r>
+                      <a:endParaRPr lang="en-US" sz="2400" dirty="0">
+                        <a:effectLst/>
+                        <a:latin typeface="Times New Roman"/>
+                        <a:ea typeface="Calibri"/>
+                        <a:cs typeface="Times New Roman"/>
+                      </a:endParaRPr>
+                    </a:p>
+                  </a:txBody>
+                  <a:tcPr marL="68580" marR="68580" marT="0" marB="0" anchor="b"/>
+                </a:tc>
+                <a:tc>
+                  <a:txBody>
+                    <a:bodyPr/>
+                    <a:lstStyle/>
+                    <a:p>
+                      <a:pPr marL="0" marR="0" algn="l">
+                        <a:lnSpc>
+                          <a:spcPct val="200000"/>
+                        </a:lnSpc>
+                        <a:spcBef>
+                          <a:spcPts val="0"/>
+                        </a:spcBef>
+                        <a:spcAft>
+                          <a:spcPts val="0"/>
+                        </a:spcAft>
+                      </a:pPr>
+                      <a:r>
+                        <a:rPr lang="en-US" sz="2400">
+                          <a:effectLst/>
+                        </a:rPr>
+                        <a:t>Number of tubes</a:t>
+                      </a:r>
+                      <a:endParaRPr lang="en-US" sz="2400">
+                        <a:effectLst/>
+                        <a:latin typeface="Times New Roman"/>
+                        <a:ea typeface="Calibri"/>
+                        <a:cs typeface="Times New Roman"/>
+                      </a:endParaRPr>
+                    </a:p>
+                  </a:txBody>
+                  <a:tcPr marL="68580" marR="68580" marT="0" marB="0" anchor="b"/>
+                </a:tc>
+                <a:tc>
+                  <a:txBody>
+                    <a:bodyPr/>
+                    <a:lstStyle/>
+                    <a:p>
+                      <a:pPr marL="0" marR="0" algn="l">
+                        <a:lnSpc>
+                          <a:spcPct val="200000"/>
+                        </a:lnSpc>
+                        <a:spcBef>
+                          <a:spcPts val="0"/>
+                        </a:spcBef>
+                        <a:spcAft>
+                          <a:spcPts val="0"/>
+                        </a:spcAft>
+                      </a:pPr>
+                      <a:r>
+                        <a:rPr lang="en-US" sz="2400">
+                          <a:effectLst/>
+                        </a:rPr>
+                        <a:t>Tube diameter</a:t>
+                      </a:r>
+                      <a:endParaRPr lang="en-US" sz="2400">
+                        <a:effectLst/>
+                        <a:latin typeface="Times New Roman"/>
+                        <a:ea typeface="Calibri"/>
+                        <a:cs typeface="Times New Roman"/>
+                      </a:endParaRPr>
+                    </a:p>
+                  </a:txBody>
+                  <a:tcPr marL="68580" marR="68580" marT="0" marB="0" anchor="b"/>
+                </a:tc>
+              </a:tr>
+              <a:tr h="190500">
+                <a:tc>
+                  <a:txBody>
+                    <a:bodyPr/>
+                    <a:lstStyle/>
+                    <a:p>
+                      <a:pPr marL="0" marR="0" algn="r">
+                        <a:lnSpc>
+                          <a:spcPct val="200000"/>
+                        </a:lnSpc>
+                        <a:spcBef>
+                          <a:spcPts val="0"/>
+                        </a:spcBef>
+                        <a:spcAft>
+                          <a:spcPts val="0"/>
+                        </a:spcAft>
+                      </a:pPr>
+                      <a:r>
+                        <a:rPr lang="en-US" sz="2400" dirty="0">
+                          <a:effectLst/>
+                        </a:rPr>
+                        <a:t>1</a:t>
+                      </a:r>
+                      <a:endParaRPr lang="en-US" sz="2400" dirty="0">
+                        <a:effectLst/>
+                        <a:latin typeface="Times New Roman"/>
+                        <a:ea typeface="Calibri"/>
+                        <a:cs typeface="Times New Roman"/>
+                      </a:endParaRPr>
+                    </a:p>
+                  </a:txBody>
+                  <a:tcPr marL="68580" marR="68580" marT="0" marB="0" anchor="b"/>
+                </a:tc>
+                <a:tc>
+                  <a:txBody>
+                    <a:bodyPr/>
+                    <a:lstStyle/>
+                    <a:p>
+                      <a:pPr marL="0" marR="0" algn="r">
+                        <a:lnSpc>
+                          <a:spcPct val="200000"/>
+                        </a:lnSpc>
+                        <a:spcBef>
+                          <a:spcPts val="0"/>
+                        </a:spcBef>
+                        <a:spcAft>
+                          <a:spcPts val="0"/>
+                        </a:spcAft>
+                      </a:pPr>
+                      <a:r>
+                        <a:rPr lang="en-US" sz="2400" dirty="0">
+                          <a:effectLst/>
+                        </a:rPr>
+                        <a:t>6191</a:t>
+                      </a:r>
+                      <a:endParaRPr lang="en-US" sz="2400" dirty="0">
+                        <a:effectLst/>
+                        <a:latin typeface="Times New Roman"/>
+                        <a:ea typeface="Calibri"/>
+                        <a:cs typeface="Times New Roman"/>
+                      </a:endParaRPr>
+                    </a:p>
+                  </a:txBody>
+                  <a:tcPr marL="68580" marR="68580" marT="0" marB="0" anchor="b"/>
+                </a:tc>
+                <a:tc>
+                  <a:txBody>
+                    <a:bodyPr/>
+                    <a:lstStyle/>
+                    <a:p>
+                      <a:pPr marL="0" marR="0" algn="r">
+                        <a:lnSpc>
+                          <a:spcPct val="200000"/>
+                        </a:lnSpc>
+                        <a:spcBef>
+                          <a:spcPts val="0"/>
+                        </a:spcBef>
+                        <a:spcAft>
+                          <a:spcPts val="0"/>
+                        </a:spcAft>
+                      </a:pPr>
+                      <a:r>
+                        <a:rPr lang="en-US" sz="2400">
+                          <a:effectLst/>
+                        </a:rPr>
+                        <a:t>12.7</a:t>
+                      </a:r>
+                      <a:endParaRPr lang="en-US" sz="2400">
+                        <a:effectLst/>
+                        <a:latin typeface="Times New Roman"/>
+                        <a:ea typeface="Calibri"/>
+                        <a:cs typeface="Times New Roman"/>
+                      </a:endParaRPr>
+                    </a:p>
+                  </a:txBody>
+                  <a:tcPr marL="68580" marR="68580" marT="0" marB="0" anchor="b"/>
+                </a:tc>
+              </a:tr>
+              <a:tr h="190500">
+                <a:tc>
+                  <a:txBody>
+                    <a:bodyPr/>
+                    <a:lstStyle/>
+                    <a:p>
+                      <a:pPr marL="0" marR="0" algn="r">
+                        <a:lnSpc>
+                          <a:spcPct val="200000"/>
+                        </a:lnSpc>
+                        <a:spcBef>
+                          <a:spcPts val="0"/>
+                        </a:spcBef>
+                        <a:spcAft>
+                          <a:spcPts val="0"/>
+                        </a:spcAft>
+                      </a:pPr>
+                      <a:r>
+                        <a:rPr lang="en-US" sz="2400">
+                          <a:effectLst/>
+                        </a:rPr>
+                        <a:t>2</a:t>
+                      </a:r>
+                      <a:endParaRPr lang="en-US" sz="2400">
+                        <a:effectLst/>
+                        <a:latin typeface="Times New Roman"/>
+                        <a:ea typeface="Calibri"/>
+                        <a:cs typeface="Times New Roman"/>
+                      </a:endParaRPr>
+                    </a:p>
+                  </a:txBody>
+                  <a:tcPr marL="68580" marR="68580" marT="0" marB="0" anchor="b"/>
+                </a:tc>
+                <a:tc>
+                  <a:txBody>
+                    <a:bodyPr/>
+                    <a:lstStyle/>
+                    <a:p>
+                      <a:pPr marL="0" marR="0" algn="r">
+                        <a:lnSpc>
+                          <a:spcPct val="200000"/>
+                        </a:lnSpc>
+                        <a:spcBef>
+                          <a:spcPts val="0"/>
+                        </a:spcBef>
+                        <a:spcAft>
+                          <a:spcPts val="0"/>
+                        </a:spcAft>
+                      </a:pPr>
+                      <a:r>
+                        <a:rPr lang="en-US" sz="2400" dirty="0">
+                          <a:effectLst/>
+                        </a:rPr>
+                        <a:t>3095</a:t>
+                      </a:r>
+                      <a:endParaRPr lang="en-US" sz="2400" dirty="0">
+                        <a:effectLst/>
+                        <a:latin typeface="Times New Roman"/>
+                        <a:ea typeface="Calibri"/>
+                        <a:cs typeface="Times New Roman"/>
+                      </a:endParaRPr>
+                    </a:p>
+                  </a:txBody>
+                  <a:tcPr marL="68580" marR="68580" marT="0" marB="0" anchor="b"/>
+                </a:tc>
+                <a:tc>
+                  <a:txBody>
+                    <a:bodyPr/>
+                    <a:lstStyle/>
+                    <a:p>
+                      <a:pPr>
+                        <a:lnSpc>
+                          <a:spcPct val="115000"/>
+                        </a:lnSpc>
+                      </a:pPr>
+                      <a:endParaRPr lang="en-US" sz="2400">
+                        <a:effectLst/>
+                        <a:latin typeface="Times New Roman"/>
+                        <a:cs typeface="Times New Roman"/>
+                      </a:endParaRPr>
+                    </a:p>
+                  </a:txBody>
+                  <a:tcPr marL="68580" marR="68580" marT="0" marB="0" anchor="b"/>
+                </a:tc>
+              </a:tr>
+              <a:tr h="190500">
+                <a:tc>
+                  <a:txBody>
+                    <a:bodyPr/>
+                    <a:lstStyle/>
+                    <a:p>
+                      <a:pPr marL="0" marR="0" algn="r">
+                        <a:lnSpc>
+                          <a:spcPct val="200000"/>
+                        </a:lnSpc>
+                        <a:spcBef>
+                          <a:spcPts val="0"/>
+                        </a:spcBef>
+                        <a:spcAft>
+                          <a:spcPts val="0"/>
+                        </a:spcAft>
+                      </a:pPr>
+                      <a:r>
+                        <a:rPr lang="en-US" sz="2400">
+                          <a:effectLst/>
+                        </a:rPr>
+                        <a:t>3</a:t>
+                      </a:r>
+                      <a:endParaRPr lang="en-US" sz="2400">
+                        <a:effectLst/>
+                        <a:latin typeface="Times New Roman"/>
+                        <a:ea typeface="Calibri"/>
+                        <a:cs typeface="Times New Roman"/>
+                      </a:endParaRPr>
+                    </a:p>
+                  </a:txBody>
+                  <a:tcPr marL="68580" marR="68580" marT="0" marB="0" anchor="b"/>
+                </a:tc>
+                <a:tc>
+                  <a:txBody>
+                    <a:bodyPr/>
+                    <a:lstStyle/>
+                    <a:p>
+                      <a:pPr marL="0" marR="0" algn="r">
+                        <a:lnSpc>
+                          <a:spcPct val="200000"/>
+                        </a:lnSpc>
+                        <a:spcBef>
+                          <a:spcPts val="0"/>
+                        </a:spcBef>
+                        <a:spcAft>
+                          <a:spcPts val="0"/>
+                        </a:spcAft>
+                      </a:pPr>
+                      <a:r>
+                        <a:rPr lang="en-US" sz="2400" dirty="0">
+                          <a:effectLst/>
+                        </a:rPr>
+                        <a:t>2064</a:t>
+                      </a:r>
+                      <a:endParaRPr lang="en-US" sz="2400" dirty="0">
+                        <a:effectLst/>
+                        <a:latin typeface="Times New Roman"/>
+                        <a:ea typeface="Calibri"/>
+                        <a:cs typeface="Times New Roman"/>
+                      </a:endParaRPr>
+                    </a:p>
+                  </a:txBody>
+                  <a:tcPr marL="68580" marR="68580" marT="0" marB="0" anchor="b"/>
+                </a:tc>
+                <a:tc>
+                  <a:txBody>
+                    <a:bodyPr/>
+                    <a:lstStyle/>
+                    <a:p>
+                      <a:pPr>
+                        <a:lnSpc>
+                          <a:spcPct val="115000"/>
+                        </a:lnSpc>
+                      </a:pPr>
+                      <a:endParaRPr lang="en-US" sz="2400">
+                        <a:effectLst/>
+                        <a:latin typeface="Times New Roman"/>
+                        <a:cs typeface="Times New Roman"/>
+                      </a:endParaRPr>
+                    </a:p>
+                  </a:txBody>
+                  <a:tcPr marL="68580" marR="68580" marT="0" marB="0" anchor="b"/>
+                </a:tc>
+              </a:tr>
+              <a:tr h="190500">
+                <a:tc>
+                  <a:txBody>
+                    <a:bodyPr/>
+                    <a:lstStyle/>
+                    <a:p>
+                      <a:pPr marL="0" marR="0" algn="r">
+                        <a:lnSpc>
+                          <a:spcPct val="200000"/>
+                        </a:lnSpc>
+                        <a:spcBef>
+                          <a:spcPts val="0"/>
+                        </a:spcBef>
+                        <a:spcAft>
+                          <a:spcPts val="0"/>
+                        </a:spcAft>
+                      </a:pPr>
+                      <a:r>
+                        <a:rPr lang="en-US" sz="2400">
+                          <a:effectLst/>
+                        </a:rPr>
+                        <a:t>4</a:t>
+                      </a:r>
+                      <a:endParaRPr lang="en-US" sz="2400">
+                        <a:effectLst/>
+                        <a:latin typeface="Times New Roman"/>
+                        <a:ea typeface="Calibri"/>
+                        <a:cs typeface="Times New Roman"/>
+                      </a:endParaRPr>
+                    </a:p>
+                  </a:txBody>
+                  <a:tcPr marL="68580" marR="68580" marT="0" marB="0" anchor="b"/>
+                </a:tc>
+                <a:tc>
+                  <a:txBody>
+                    <a:bodyPr/>
+                    <a:lstStyle/>
+                    <a:p>
+                      <a:pPr marL="0" marR="0" algn="r">
+                        <a:lnSpc>
+                          <a:spcPct val="200000"/>
+                        </a:lnSpc>
+                        <a:spcBef>
+                          <a:spcPts val="0"/>
+                        </a:spcBef>
+                        <a:spcAft>
+                          <a:spcPts val="0"/>
+                        </a:spcAft>
+                      </a:pPr>
+                      <a:r>
+                        <a:rPr lang="en-US" sz="2400">
+                          <a:effectLst/>
+                        </a:rPr>
+                        <a:t>1548</a:t>
+                      </a:r>
+                      <a:endParaRPr lang="en-US" sz="2400">
+                        <a:effectLst/>
+                        <a:latin typeface="Times New Roman"/>
+                        <a:ea typeface="Calibri"/>
+                        <a:cs typeface="Times New Roman"/>
+                      </a:endParaRPr>
+                    </a:p>
+                  </a:txBody>
+                  <a:tcPr marL="68580" marR="68580" marT="0" marB="0" anchor="b"/>
+                </a:tc>
+                <a:tc>
+                  <a:txBody>
+                    <a:bodyPr/>
+                    <a:lstStyle/>
+                    <a:p>
+                      <a:pPr>
+                        <a:lnSpc>
+                          <a:spcPct val="115000"/>
+                        </a:lnSpc>
+                      </a:pPr>
+                      <a:endParaRPr lang="en-US" sz="2400" dirty="0">
+                        <a:effectLst/>
+                        <a:latin typeface="Times New Roman"/>
+                        <a:cs typeface="Times New Roman"/>
+                      </a:endParaRPr>
+                    </a:p>
+                  </a:txBody>
+                  <a:tcPr marL="68580" marR="68580" marT="0" marB="0" anchor="b"/>
+                </a:tc>
+              </a:tr>
+              <a:tr h="190500">
+                <a:tc>
+                  <a:txBody>
+                    <a:bodyPr/>
+                    <a:lstStyle/>
+                    <a:p>
+                      <a:pPr marL="0" marR="0" algn="r">
+                        <a:lnSpc>
+                          <a:spcPct val="200000"/>
+                        </a:lnSpc>
+                        <a:spcBef>
+                          <a:spcPts val="0"/>
+                        </a:spcBef>
+                        <a:spcAft>
+                          <a:spcPts val="0"/>
+                        </a:spcAft>
+                      </a:pPr>
+                      <a:r>
+                        <a:rPr lang="en-US" sz="2400">
+                          <a:effectLst/>
+                        </a:rPr>
+                        <a:t>5</a:t>
+                      </a:r>
+                      <a:endParaRPr lang="en-US" sz="2400">
+                        <a:effectLst/>
+                        <a:latin typeface="Times New Roman"/>
+                        <a:ea typeface="Calibri"/>
+                        <a:cs typeface="Times New Roman"/>
+                      </a:endParaRPr>
+                    </a:p>
+                  </a:txBody>
+                  <a:tcPr marL="68580" marR="68580" marT="0" marB="0" anchor="b"/>
+                </a:tc>
+                <a:tc>
+                  <a:txBody>
+                    <a:bodyPr/>
+                    <a:lstStyle/>
+                    <a:p>
+                      <a:pPr marL="0" marR="0" algn="r">
+                        <a:lnSpc>
+                          <a:spcPct val="200000"/>
+                        </a:lnSpc>
+                        <a:spcBef>
+                          <a:spcPts val="0"/>
+                        </a:spcBef>
+                        <a:spcAft>
+                          <a:spcPts val="0"/>
+                        </a:spcAft>
+                      </a:pPr>
+                      <a:r>
+                        <a:rPr lang="en-US" sz="2400">
+                          <a:effectLst/>
+                        </a:rPr>
+                        <a:t>1238</a:t>
+                      </a:r>
+                      <a:endParaRPr lang="en-US" sz="2400">
+                        <a:effectLst/>
+                        <a:latin typeface="Times New Roman"/>
+                        <a:ea typeface="Calibri"/>
+                        <a:cs typeface="Times New Roman"/>
+                      </a:endParaRPr>
+                    </a:p>
+                  </a:txBody>
+                  <a:tcPr marL="68580" marR="68580" marT="0" marB="0" anchor="b"/>
+                </a:tc>
+                <a:tc>
+                  <a:txBody>
+                    <a:bodyPr/>
+                    <a:lstStyle/>
+                    <a:p>
+                      <a:pPr>
+                        <a:lnSpc>
+                          <a:spcPct val="115000"/>
+                        </a:lnSpc>
+                      </a:pPr>
+                      <a:endParaRPr lang="en-US" sz="2400" dirty="0">
+                        <a:effectLst/>
+                        <a:latin typeface="Times New Roman"/>
+                        <a:cs typeface="Times New Roman"/>
+                      </a:endParaRPr>
+                    </a:p>
+                  </a:txBody>
+                  <a:tcPr marL="68580" marR="68580" marT="0" marB="0" anchor="b"/>
+                </a:tc>
+              </a:tr>
+            </a:tbl>
+          </a:graphicData>
+        </a:graphic>
+      </p:graphicFrame>
     </p:spTree>
     <p:extLst>
       <p:ext uri="{BB962C8B-B14F-4D97-AF65-F5344CB8AC3E}">
-        <p14:creationId xmlns:p14="http://schemas.microsoft.com/office/powerpoint/2010/main" val="3552849666"/>
+        <p14:creationId xmlns:p14="http://schemas.microsoft.com/office/powerpoint/2010/main" val="283262483"/>
       </p:ext>
     </p:extLst>
   </p:cSld>
@@ -7423,6 +8411,86 @@
 </p:sld>
 </file>
 
+<file path=ppt/slides/slide30.xml><?xml version="1.0" encoding="utf-8"?>
+<p:sld xmlns:a="http://schemas.openxmlformats.org/drawingml/2006/main" xmlns:r="http://schemas.openxmlformats.org/officeDocument/2006/relationships" xmlns:p="http://schemas.openxmlformats.org/presentationml/2006/main">
+  <p:cSld>
+    <p:spTree>
+      <p:nvGrpSpPr>
+        <p:cNvPr id="1" name=""/>
+        <p:cNvGrpSpPr/>
+        <p:nvPr/>
+      </p:nvGrpSpPr>
+      <p:grpSpPr>
+        <a:xfrm>
+          <a:off x="0" y="0"/>
+          <a:ext cx="0" cy="0"/>
+          <a:chOff x="0" y="0"/>
+          <a:chExt cx="0" cy="0"/>
+        </a:xfrm>
+      </p:grpSpPr>
+      <p:sp>
+        <p:nvSpPr>
+          <p:cNvPr id="2" name="Title 1"/>
+          <p:cNvSpPr>
+            <a:spLocks noGrp="1"/>
+          </p:cNvSpPr>
+          <p:nvPr>
+            <p:ph type="title"/>
+          </p:nvPr>
+        </p:nvSpPr>
+        <p:spPr/>
+        <p:txBody>
+          <a:bodyPr/>
+          <a:lstStyle/>
+          <a:p>
+            <a:r>
+              <a:rPr lang="en-US" dirty="0" smtClean="0"/>
+              <a:t>Conclusion</a:t>
+            </a:r>
+            <a:endParaRPr lang="en-US" dirty="0"/>
+          </a:p>
+        </p:txBody>
+      </p:sp>
+      <p:sp>
+        <p:nvSpPr>
+          <p:cNvPr id="3" name="Content Placeholder 2"/>
+          <p:cNvSpPr>
+            <a:spLocks noGrp="1"/>
+          </p:cNvSpPr>
+          <p:nvPr>
+            <p:ph idx="1"/>
+          </p:nvPr>
+        </p:nvSpPr>
+        <p:spPr/>
+        <p:txBody>
+          <a:bodyPr/>
+          <a:lstStyle/>
+          <a:p>
+            <a:r>
+              <a:rPr lang="en-US" dirty="0" smtClean="0"/>
+              <a:t>It was apparent at this stage of the project that the heat available was too little, and that heat exchanger size requirements were prohibitively </a:t>
+            </a:r>
+            <a:r>
+              <a:rPr lang="en-US" dirty="0" smtClean="0"/>
+              <a:t>large. A viable organic Rankine cycle is possible with similar temperature waste heat, but not in an automotive application.</a:t>
+            </a:r>
+            <a:endParaRPr lang="en-US" dirty="0"/>
+          </a:p>
+        </p:txBody>
+      </p:sp>
+    </p:spTree>
+    <p:extLst>
+      <p:ext uri="{BB962C8B-B14F-4D97-AF65-F5344CB8AC3E}">
+        <p14:creationId xmlns:p14="http://schemas.microsoft.com/office/powerpoint/2010/main" val="3552849666"/>
+      </p:ext>
+    </p:extLst>
+  </p:cSld>
+  <p:clrMapOvr>
+    <a:masterClrMapping/>
+  </p:clrMapOvr>
+</p:sld>
+</file>
+
 <file path=ppt/slides/slide4.xml><?xml version="1.0" encoding="utf-8"?>
 <p:sld xmlns:a="http://schemas.openxmlformats.org/drawingml/2006/main" xmlns:r="http://schemas.openxmlformats.org/officeDocument/2006/relationships" xmlns:p="http://schemas.openxmlformats.org/presentationml/2006/main">
   <p:cSld>
@@ -7445,7 +8513,7 @@
           <p:cNvPr id="2" name="Title 1">
             <a:extLst>
               <a:ext uri="{FF2B5EF4-FFF2-40B4-BE49-F238E27FC236}">
-                <a16:creationId xmlns:a16="http://schemas.microsoft.com/office/drawing/2014/main" xmlns="" id="{6F8DA60C-9486-4219-A7C5-5BB10F1608C0}"/>
+                <a16:creationId xmlns="" xmlns:a16="http://schemas.microsoft.com/office/drawing/2014/main" id="{6F8DA60C-9486-4219-A7C5-5BB10F1608C0}"/>
               </a:ext>
             </a:extLst>
           </p:cNvPr>
@@ -7473,7 +8541,7 @@
           <p:cNvPr id="3" name="Content Placeholder 2">
             <a:extLst>
               <a:ext uri="{FF2B5EF4-FFF2-40B4-BE49-F238E27FC236}">
-                <a16:creationId xmlns:a16="http://schemas.microsoft.com/office/drawing/2014/main" xmlns="" id="{6BE37908-D4AA-4FC5-A745-3DF05D6C61F8}"/>
+                <a16:creationId xmlns="" xmlns:a16="http://schemas.microsoft.com/office/drawing/2014/main" id="{6BE37908-D4AA-4FC5-A745-3DF05D6C61F8}"/>
               </a:ext>
             </a:extLst>
           </p:cNvPr>
@@ -7553,7 +8621,7 @@
           <p:cNvPr id="2" name="Title 1">
             <a:extLst>
               <a:ext uri="{FF2B5EF4-FFF2-40B4-BE49-F238E27FC236}">
-                <a16:creationId xmlns:a16="http://schemas.microsoft.com/office/drawing/2014/main" xmlns="" id="{470BFCEC-DABB-4EC1-B1CC-BF304F479C2B}"/>
+                <a16:creationId xmlns="" xmlns:a16="http://schemas.microsoft.com/office/drawing/2014/main" id="{470BFCEC-DABB-4EC1-B1CC-BF304F479C2B}"/>
               </a:ext>
             </a:extLst>
           </p:cNvPr>
@@ -7581,7 +8649,7 @@
           <p:cNvPr id="3" name="Content Placeholder 2">
             <a:extLst>
               <a:ext uri="{FF2B5EF4-FFF2-40B4-BE49-F238E27FC236}">
-                <a16:creationId xmlns:a16="http://schemas.microsoft.com/office/drawing/2014/main" xmlns="" id="{B61D9D02-6C4D-4A29-8966-64485BF4D488}"/>
+                <a16:creationId xmlns="" xmlns:a16="http://schemas.microsoft.com/office/drawing/2014/main" id="{B61D9D02-6C4D-4A29-8966-64485BF4D488}"/>
               </a:ext>
             </a:extLst>
           </p:cNvPr>
@@ -7657,7 +8725,7 @@
           <p:cNvPr id="2" name="Title 1">
             <a:extLst>
               <a:ext uri="{FF2B5EF4-FFF2-40B4-BE49-F238E27FC236}">
-                <a16:creationId xmlns:a16="http://schemas.microsoft.com/office/drawing/2014/main" xmlns="" id="{331927DC-5129-474A-A516-2F862BB1D21F}"/>
+                <a16:creationId xmlns="" xmlns:a16="http://schemas.microsoft.com/office/drawing/2014/main" id="{331927DC-5129-474A-A516-2F862BB1D21F}"/>
               </a:ext>
             </a:extLst>
           </p:cNvPr>
@@ -7685,7 +8753,7 @@
           <p:cNvPr id="3" name="Content Placeholder 2">
             <a:extLst>
               <a:ext uri="{FF2B5EF4-FFF2-40B4-BE49-F238E27FC236}">
-                <a16:creationId xmlns:a16="http://schemas.microsoft.com/office/drawing/2014/main" xmlns="" id="{05872D73-2B19-4E1A-915E-675A86403A5A}"/>
+                <a16:creationId xmlns="" xmlns:a16="http://schemas.microsoft.com/office/drawing/2014/main" id="{05872D73-2B19-4E1A-915E-675A86403A5A}"/>
               </a:ext>
             </a:extLst>
           </p:cNvPr>
@@ -7755,7 +8823,7 @@
           <p:cNvPr id="2" name="Title 1">
             <a:extLst>
               <a:ext uri="{FF2B5EF4-FFF2-40B4-BE49-F238E27FC236}">
-                <a16:creationId xmlns:a16="http://schemas.microsoft.com/office/drawing/2014/main" xmlns="" id="{0C7F8C0F-4CBA-4B8F-BD92-4F83B1E6A27A}"/>
+                <a16:creationId xmlns="" xmlns:a16="http://schemas.microsoft.com/office/drawing/2014/main" id="{0C7F8C0F-4CBA-4B8F-BD92-4F83B1E6A27A}"/>
               </a:ext>
             </a:extLst>
           </p:cNvPr>
@@ -7783,7 +8851,7 @@
           <p:cNvPr id="3" name="Content Placeholder 2">
             <a:extLst>
               <a:ext uri="{FF2B5EF4-FFF2-40B4-BE49-F238E27FC236}">
-                <a16:creationId xmlns:a16="http://schemas.microsoft.com/office/drawing/2014/main" xmlns="" id="{DDA4D531-4F80-4F6F-A4F9-E81EC206F8E6}"/>
+                <a16:creationId xmlns="" xmlns:a16="http://schemas.microsoft.com/office/drawing/2014/main" id="{DDA4D531-4F80-4F6F-A4F9-E81EC206F8E6}"/>
               </a:ext>
             </a:extLst>
           </p:cNvPr>
@@ -7859,7 +8927,7 @@
           <p:cNvPr id="2" name="Title 1">
             <a:extLst>
               <a:ext uri="{FF2B5EF4-FFF2-40B4-BE49-F238E27FC236}">
-                <a16:creationId xmlns:a16="http://schemas.microsoft.com/office/drawing/2014/main" xmlns="" id="{AE75A445-EFCD-4A97-9022-E64BD9699D1C}"/>
+                <a16:creationId xmlns="" xmlns:a16="http://schemas.microsoft.com/office/drawing/2014/main" id="{AE75A445-EFCD-4A97-9022-E64BD9699D1C}"/>
               </a:ext>
             </a:extLst>
           </p:cNvPr>
@@ -7887,7 +8955,7 @@
           <p:cNvPr id="3" name="Content Placeholder 2">
             <a:extLst>
               <a:ext uri="{FF2B5EF4-FFF2-40B4-BE49-F238E27FC236}">
-                <a16:creationId xmlns:a16="http://schemas.microsoft.com/office/drawing/2014/main" xmlns="" id="{CF3DEB28-2C55-43DD-A916-45100A056F61}"/>
+                <a16:creationId xmlns="" xmlns:a16="http://schemas.microsoft.com/office/drawing/2014/main" id="{CF3DEB28-2C55-43DD-A916-45100A056F61}"/>
               </a:ext>
             </a:extLst>
           </p:cNvPr>
@@ -8210,7 +9278,7 @@
   <a:extraClrSchemeLst/>
   <a:extLst>
     <a:ext uri="{05A4C25C-085E-4340-85A3-A5531E510DB2}">
-      <thm15:themeFamily xmlns:thm15="http://schemas.microsoft.com/office/thememl/2012/main" xmlns="" name="Office Theme" id="{62F939B6-93AF-4DB8-9C6B-D6C7DFDC589F}" vid="{4A3C46E8-61CC-4603-A589-7422A47A8E4A}"/>
+      <thm15:themeFamily xmlns="" xmlns:thm15="http://schemas.microsoft.com/office/thememl/2012/main" name="Office Theme" id="{62F939B6-93AF-4DB8-9C6B-D6C7DFDC589F}" vid="{4A3C46E8-61CC-4603-A589-7422A47A8E4A}"/>
     </a:ext>
   </a:extLst>
 </a:theme>
@@ -8505,7 +9573,7 @@
   <a:extraClrSchemeLst/>
   <a:extLst>
     <a:ext uri="{05A4C25C-085E-4340-85A3-A5531E510DB2}">
-      <thm15:themeFamily xmlns:thm15="http://schemas.microsoft.com/office/thememl/2012/main" xmlns="" name="Office Theme" id="{62F939B6-93AF-4DB8-9C6B-D6C7DFDC589F}" vid="{4A3C46E8-61CC-4603-A589-7422A47A8E4A}"/>
+      <thm15:themeFamily xmlns="" xmlns:thm15="http://schemas.microsoft.com/office/thememl/2012/main" name="Office Theme" id="{62F939B6-93AF-4DB8-9C6B-D6C7DFDC589F}" vid="{4A3C46E8-61CC-4603-A589-7422A47A8E4A}"/>
     </a:ext>
   </a:extLst>
 </a:theme>

</xml_diff>